<commit_message>
18/4/16 stuf from home that hadnt been updated
</commit_message>
<xml_diff>
--- a/BackgroundInfo/Selective export of microRNA via extracellular vesicles (2).pptx
+++ b/BackgroundInfo/Selective export of microRNA via extracellular vesicles (2).pptx
@@ -5,7 +5,7 @@
     <p:sldMasterId id="2147483660" r:id="rId1"/>
   </p:sldMasterIdLst>
   <p:notesMasterIdLst>
-    <p:notesMasterId r:id="rId17"/>
+    <p:notesMasterId r:id="rId18"/>
   </p:notesMasterIdLst>
   <p:sldIdLst>
     <p:sldId id="256" r:id="rId2"/>
@@ -13,16 +13,17 @@
     <p:sldId id="258" r:id="rId4"/>
     <p:sldId id="259" r:id="rId5"/>
     <p:sldId id="272" r:id="rId6"/>
-    <p:sldId id="260" r:id="rId7"/>
-    <p:sldId id="261" r:id="rId8"/>
-    <p:sldId id="263" r:id="rId9"/>
-    <p:sldId id="264" r:id="rId10"/>
-    <p:sldId id="267" r:id="rId11"/>
-    <p:sldId id="268" r:id="rId12"/>
-    <p:sldId id="269" r:id="rId13"/>
-    <p:sldId id="270" r:id="rId14"/>
-    <p:sldId id="271" r:id="rId15"/>
-    <p:sldId id="273" r:id="rId16"/>
+    <p:sldId id="261" r:id="rId7"/>
+    <p:sldId id="263" r:id="rId8"/>
+    <p:sldId id="264" r:id="rId9"/>
+    <p:sldId id="267" r:id="rId10"/>
+    <p:sldId id="268" r:id="rId11"/>
+    <p:sldId id="269" r:id="rId12"/>
+    <p:sldId id="270" r:id="rId13"/>
+    <p:sldId id="271" r:id="rId14"/>
+    <p:sldId id="273" r:id="rId15"/>
+    <p:sldId id="274" r:id="rId16"/>
+    <p:sldId id="275" r:id="rId17"/>
   </p:sldIdLst>
   <p:sldSz cx="12192000" cy="6858000"/>
   <p:notesSz cx="6858000" cy="9144000"/>
@@ -211,7 +212,7 @@
           <a:p>
             <a:fld id="{0B21FBDF-C287-422C-92BB-131BF3E59FE0}" type="datetimeFigureOut">
               <a:rPr lang="en-AU" smtClean="0"/>
-              <a:t>22/03/2016</a:t>
+              <a:t>27/03/2016</a:t>
             </a:fld>
             <a:endParaRPr lang="en-AU"/>
           </a:p>
@@ -523,6 +524,10 @@
           <a:bodyPr/>
           <a:lstStyle/>
           <a:p>
+            <a:r>
+              <a:rPr lang="en-AU" dirty="0" smtClean="0"/>
+              <a:t>10</a:t>
+            </a:r>
             <a:endParaRPr lang="en-AU" dirty="0"/>
           </a:p>
         </p:txBody>
@@ -554,6 +559,358 @@
     <p:extLst>
       <p:ext uri="{BB962C8B-B14F-4D97-AF65-F5344CB8AC3E}">
         <p14:creationId xmlns:p14="http://schemas.microsoft.com/office/powerpoint/2010/main" val="3134058491"/>
+      </p:ext>
+    </p:extLst>
+  </p:cSld>
+  <p:clrMapOvr>
+    <a:masterClrMapping/>
+  </p:clrMapOvr>
+</p:notes>
+</file>
+
+<file path=ppt/notesSlides/notesSlide10.xml><?xml version="1.0" encoding="utf-8"?>
+<p:notes xmlns:a="http://schemas.openxmlformats.org/drawingml/2006/main" xmlns:r="http://schemas.openxmlformats.org/officeDocument/2006/relationships" xmlns:p="http://schemas.openxmlformats.org/presentationml/2006/main">
+  <p:cSld>
+    <p:spTree>
+      <p:nvGrpSpPr>
+        <p:cNvPr id="1" name=""/>
+        <p:cNvGrpSpPr/>
+        <p:nvPr/>
+      </p:nvGrpSpPr>
+      <p:grpSpPr>
+        <a:xfrm>
+          <a:off x="0" y="0"/>
+          <a:ext cx="0" cy="0"/>
+          <a:chOff x="0" y="0"/>
+          <a:chExt cx="0" cy="0"/>
+        </a:xfrm>
+      </p:grpSpPr>
+      <p:sp>
+        <p:nvSpPr>
+          <p:cNvPr id="2" name="Slide Image Placeholder 1"/>
+          <p:cNvSpPr>
+            <a:spLocks noGrp="1" noRot="1" noChangeAspect="1"/>
+          </p:cNvSpPr>
+          <p:nvPr>
+            <p:ph type="sldImg"/>
+          </p:nvPr>
+        </p:nvSpPr>
+        <p:spPr/>
+      </p:sp>
+      <p:sp>
+        <p:nvSpPr>
+          <p:cNvPr id="3" name="Notes Placeholder 2"/>
+          <p:cNvSpPr>
+            <a:spLocks noGrp="1"/>
+          </p:cNvSpPr>
+          <p:nvPr>
+            <p:ph type="body" idx="1"/>
+          </p:nvPr>
+        </p:nvSpPr>
+        <p:spPr/>
+        <p:txBody>
+          <a:bodyPr/>
+          <a:lstStyle/>
+          <a:p>
+            <a:r>
+              <a:rPr lang="en-AU" dirty="0" smtClean="0"/>
+              <a:t>6.50</a:t>
+            </a:r>
+            <a:endParaRPr lang="en-AU" dirty="0"/>
+          </a:p>
+        </p:txBody>
+      </p:sp>
+      <p:sp>
+        <p:nvSpPr>
+          <p:cNvPr id="4" name="Slide Number Placeholder 3"/>
+          <p:cNvSpPr>
+            <a:spLocks noGrp="1"/>
+          </p:cNvSpPr>
+          <p:nvPr>
+            <p:ph type="sldNum" sz="quarter" idx="10"/>
+          </p:nvPr>
+        </p:nvSpPr>
+        <p:spPr/>
+        <p:txBody>
+          <a:bodyPr/>
+          <a:lstStyle/>
+          <a:p>
+            <a:fld id="{50E92962-0362-434D-A7A6-86BA87293389}" type="slidenum">
+              <a:rPr lang="en-AU" smtClean="0"/>
+              <a:t>10</a:t>
+            </a:fld>
+            <a:endParaRPr lang="en-AU"/>
+          </a:p>
+        </p:txBody>
+      </p:sp>
+    </p:spTree>
+    <p:extLst>
+      <p:ext uri="{BB962C8B-B14F-4D97-AF65-F5344CB8AC3E}">
+        <p14:creationId xmlns:p14="http://schemas.microsoft.com/office/powerpoint/2010/main" val="4140009915"/>
+      </p:ext>
+    </p:extLst>
+  </p:cSld>
+  <p:clrMapOvr>
+    <a:masterClrMapping/>
+  </p:clrMapOvr>
+</p:notes>
+</file>
+
+<file path=ppt/notesSlides/notesSlide11.xml><?xml version="1.0" encoding="utf-8"?>
+<p:notes xmlns:a="http://schemas.openxmlformats.org/drawingml/2006/main" xmlns:r="http://schemas.openxmlformats.org/officeDocument/2006/relationships" xmlns:p="http://schemas.openxmlformats.org/presentationml/2006/main">
+  <p:cSld>
+    <p:spTree>
+      <p:nvGrpSpPr>
+        <p:cNvPr id="1" name=""/>
+        <p:cNvGrpSpPr/>
+        <p:nvPr/>
+      </p:nvGrpSpPr>
+      <p:grpSpPr>
+        <a:xfrm>
+          <a:off x="0" y="0"/>
+          <a:ext cx="0" cy="0"/>
+          <a:chOff x="0" y="0"/>
+          <a:chExt cx="0" cy="0"/>
+        </a:xfrm>
+      </p:grpSpPr>
+      <p:sp>
+        <p:nvSpPr>
+          <p:cNvPr id="2" name="Slide Image Placeholder 1"/>
+          <p:cNvSpPr>
+            <a:spLocks noGrp="1" noRot="1" noChangeAspect="1"/>
+          </p:cNvSpPr>
+          <p:nvPr>
+            <p:ph type="sldImg"/>
+          </p:nvPr>
+        </p:nvSpPr>
+        <p:spPr/>
+      </p:sp>
+      <p:sp>
+        <p:nvSpPr>
+          <p:cNvPr id="3" name="Notes Placeholder 2"/>
+          <p:cNvSpPr>
+            <a:spLocks noGrp="1"/>
+          </p:cNvSpPr>
+          <p:nvPr>
+            <p:ph type="body" idx="1"/>
+          </p:nvPr>
+        </p:nvSpPr>
+        <p:spPr/>
+        <p:txBody>
+          <a:bodyPr/>
+          <a:lstStyle/>
+          <a:p>
+            <a:r>
+              <a:rPr lang="en-AU" dirty="0" smtClean="0"/>
+              <a:t>7.25</a:t>
+            </a:r>
+            <a:endParaRPr lang="en-AU" dirty="0"/>
+          </a:p>
+        </p:txBody>
+      </p:sp>
+      <p:sp>
+        <p:nvSpPr>
+          <p:cNvPr id="4" name="Slide Number Placeholder 3"/>
+          <p:cNvSpPr>
+            <a:spLocks noGrp="1"/>
+          </p:cNvSpPr>
+          <p:nvPr>
+            <p:ph type="sldNum" sz="quarter" idx="10"/>
+          </p:nvPr>
+        </p:nvSpPr>
+        <p:spPr/>
+        <p:txBody>
+          <a:bodyPr/>
+          <a:lstStyle/>
+          <a:p>
+            <a:fld id="{50E92962-0362-434D-A7A6-86BA87293389}" type="slidenum">
+              <a:rPr lang="en-AU" smtClean="0"/>
+              <a:t>11</a:t>
+            </a:fld>
+            <a:endParaRPr lang="en-AU"/>
+          </a:p>
+        </p:txBody>
+      </p:sp>
+    </p:spTree>
+    <p:extLst>
+      <p:ext uri="{BB962C8B-B14F-4D97-AF65-F5344CB8AC3E}">
+        <p14:creationId xmlns:p14="http://schemas.microsoft.com/office/powerpoint/2010/main" val="4235923329"/>
+      </p:ext>
+    </p:extLst>
+  </p:cSld>
+  <p:clrMapOvr>
+    <a:masterClrMapping/>
+  </p:clrMapOvr>
+</p:notes>
+</file>
+
+<file path=ppt/notesSlides/notesSlide12.xml><?xml version="1.0" encoding="utf-8"?>
+<p:notes xmlns:a="http://schemas.openxmlformats.org/drawingml/2006/main" xmlns:r="http://schemas.openxmlformats.org/officeDocument/2006/relationships" xmlns:p="http://schemas.openxmlformats.org/presentationml/2006/main">
+  <p:cSld>
+    <p:spTree>
+      <p:nvGrpSpPr>
+        <p:cNvPr id="1" name=""/>
+        <p:cNvGrpSpPr/>
+        <p:nvPr/>
+      </p:nvGrpSpPr>
+      <p:grpSpPr>
+        <a:xfrm>
+          <a:off x="0" y="0"/>
+          <a:ext cx="0" cy="0"/>
+          <a:chOff x="0" y="0"/>
+          <a:chExt cx="0" cy="0"/>
+        </a:xfrm>
+      </p:grpSpPr>
+      <p:sp>
+        <p:nvSpPr>
+          <p:cNvPr id="2" name="Slide Image Placeholder 1"/>
+          <p:cNvSpPr>
+            <a:spLocks noGrp="1" noRot="1" noChangeAspect="1"/>
+          </p:cNvSpPr>
+          <p:nvPr>
+            <p:ph type="sldImg"/>
+          </p:nvPr>
+        </p:nvSpPr>
+        <p:spPr/>
+      </p:sp>
+      <p:sp>
+        <p:nvSpPr>
+          <p:cNvPr id="3" name="Notes Placeholder 2"/>
+          <p:cNvSpPr>
+            <a:spLocks noGrp="1"/>
+          </p:cNvSpPr>
+          <p:nvPr>
+            <p:ph type="body" idx="1"/>
+          </p:nvPr>
+        </p:nvSpPr>
+        <p:spPr/>
+        <p:txBody>
+          <a:bodyPr/>
+          <a:lstStyle/>
+          <a:p>
+            <a:endParaRPr lang="en-AU" dirty="0"/>
+          </a:p>
+        </p:txBody>
+      </p:sp>
+      <p:sp>
+        <p:nvSpPr>
+          <p:cNvPr id="4" name="Slide Number Placeholder 3"/>
+          <p:cNvSpPr>
+            <a:spLocks noGrp="1"/>
+          </p:cNvSpPr>
+          <p:nvPr>
+            <p:ph type="sldNum" sz="quarter" idx="10"/>
+          </p:nvPr>
+        </p:nvSpPr>
+        <p:spPr/>
+        <p:txBody>
+          <a:bodyPr/>
+          <a:lstStyle/>
+          <a:p>
+            <a:fld id="{50E92962-0362-434D-A7A6-86BA87293389}" type="slidenum">
+              <a:rPr lang="en-AU" smtClean="0"/>
+              <a:t>14</a:t>
+            </a:fld>
+            <a:endParaRPr lang="en-AU"/>
+          </a:p>
+        </p:txBody>
+      </p:sp>
+    </p:spTree>
+    <p:extLst>
+      <p:ext uri="{BB962C8B-B14F-4D97-AF65-F5344CB8AC3E}">
+        <p14:creationId xmlns:p14="http://schemas.microsoft.com/office/powerpoint/2010/main" val="1244007472"/>
+      </p:ext>
+    </p:extLst>
+  </p:cSld>
+  <p:clrMapOvr>
+    <a:masterClrMapping/>
+  </p:clrMapOvr>
+</p:notes>
+</file>
+
+<file path=ppt/notesSlides/notesSlide13.xml><?xml version="1.0" encoding="utf-8"?>
+<p:notes xmlns:a="http://schemas.openxmlformats.org/drawingml/2006/main" xmlns:r="http://schemas.openxmlformats.org/officeDocument/2006/relationships" xmlns:p="http://schemas.openxmlformats.org/presentationml/2006/main">
+  <p:cSld>
+    <p:spTree>
+      <p:nvGrpSpPr>
+        <p:cNvPr id="1" name=""/>
+        <p:cNvGrpSpPr/>
+        <p:nvPr/>
+      </p:nvGrpSpPr>
+      <p:grpSpPr>
+        <a:xfrm>
+          <a:off x="0" y="0"/>
+          <a:ext cx="0" cy="0"/>
+          <a:chOff x="0" y="0"/>
+          <a:chExt cx="0" cy="0"/>
+        </a:xfrm>
+      </p:grpSpPr>
+      <p:sp>
+        <p:nvSpPr>
+          <p:cNvPr id="2" name="Slide Image Placeholder 1"/>
+          <p:cNvSpPr>
+            <a:spLocks noGrp="1" noRot="1" noChangeAspect="1"/>
+          </p:cNvSpPr>
+          <p:nvPr>
+            <p:ph type="sldImg"/>
+          </p:nvPr>
+        </p:nvSpPr>
+        <p:spPr/>
+      </p:sp>
+      <p:sp>
+        <p:nvSpPr>
+          <p:cNvPr id="3" name="Notes Placeholder 2"/>
+          <p:cNvSpPr>
+            <a:spLocks noGrp="1"/>
+          </p:cNvSpPr>
+          <p:nvPr>
+            <p:ph type="body" idx="1"/>
+          </p:nvPr>
+        </p:nvSpPr>
+        <p:spPr/>
+        <p:txBody>
+          <a:bodyPr/>
+          <a:lstStyle/>
+          <a:p>
+            <a:r>
+              <a:rPr lang="en-US" dirty="0" smtClean="0"/>
+              <a:t>Why</a:t>
+            </a:r>
+            <a:r>
+              <a:rPr lang="en-US" baseline="0" dirty="0" smtClean="0"/>
+              <a:t> filter? Increases the speed of the transformation and testing. </a:t>
+            </a:r>
+            <a:endParaRPr lang="en-AU" dirty="0"/>
+          </a:p>
+        </p:txBody>
+      </p:sp>
+      <p:sp>
+        <p:nvSpPr>
+          <p:cNvPr id="4" name="Slide Number Placeholder 3"/>
+          <p:cNvSpPr>
+            <a:spLocks noGrp="1"/>
+          </p:cNvSpPr>
+          <p:nvPr>
+            <p:ph type="sldNum" sz="quarter" idx="10"/>
+          </p:nvPr>
+        </p:nvSpPr>
+        <p:spPr/>
+        <p:txBody>
+          <a:bodyPr/>
+          <a:lstStyle/>
+          <a:p>
+            <a:fld id="{50E92962-0362-434D-A7A6-86BA87293389}" type="slidenum">
+              <a:rPr lang="en-AU" smtClean="0"/>
+              <a:t>15</a:t>
+            </a:fld>
+            <a:endParaRPr lang="en-AU"/>
+          </a:p>
+        </p:txBody>
+      </p:sp>
+    </p:spTree>
+    <p:extLst>
+      <p:ext uri="{BB962C8B-B14F-4D97-AF65-F5344CB8AC3E}">
+        <p14:creationId xmlns:p14="http://schemas.microsoft.com/office/powerpoint/2010/main" val="1864688049"/>
       </p:ext>
     </p:extLst>
   </p:cSld>
@@ -607,6 +964,14 @@
           <a:bodyPr/>
           <a:lstStyle/>
           <a:p>
+            <a:r>
+              <a:rPr lang="en-AU" dirty="0" smtClean="0"/>
+              <a:t>55. What, how,</a:t>
+            </a:r>
+            <a:r>
+              <a:rPr lang="en-AU" baseline="0" dirty="0" smtClean="0"/>
+              <a:t> affect on entire pathways, need for regulation. Recently, an exciting finding…</a:t>
+            </a:r>
             <a:endParaRPr lang="en-AU" dirty="0"/>
           </a:p>
         </p:txBody>
@@ -692,12 +1057,52 @@
           <a:lstStyle/>
           <a:p>
             <a:r>
-              <a:rPr lang="en-US" dirty="0" smtClean="0"/>
-              <a:t>What, contents, advantages..</a:t>
-            </a:r>
-            <a:r>
-              <a:rPr lang="en-US" baseline="0" dirty="0" smtClean="0"/>
-              <a:t> Hereby, investigating the content can reveal function or irregularities occurring in intercellular communication</a:t>
+              <a:rPr lang="en-AU" dirty="0" smtClean="0"/>
+              <a:t>1.20. Comprised</a:t>
+            </a:r>
+            <a:r>
+              <a:rPr lang="en-AU" baseline="0" dirty="0" smtClean="0"/>
+              <a:t> of.., </a:t>
+            </a:r>
+            <a:r>
+              <a:rPr lang="en-AU" baseline="0" dirty="0" err="1" smtClean="0"/>
+              <a:t>Extracllular</a:t>
+            </a:r>
+            <a:r>
+              <a:rPr lang="en-AU" baseline="0" dirty="0" smtClean="0"/>
+              <a:t> space rife with </a:t>
+            </a:r>
+            <a:r>
+              <a:rPr lang="en-AU" baseline="0" dirty="0" err="1" smtClean="0"/>
+              <a:t>RNase</a:t>
+            </a:r>
+            <a:r>
+              <a:rPr lang="en-AU" baseline="0" dirty="0" smtClean="0"/>
+              <a:t> activity.. This allows for the </a:t>
+            </a:r>
+            <a:r>
+              <a:rPr lang="en-AU" baseline="0" dirty="0" err="1" smtClean="0"/>
+              <a:t>mIRNAs</a:t>
+            </a:r>
+            <a:r>
+              <a:rPr lang="en-AU" baseline="0" dirty="0" smtClean="0"/>
+              <a:t> to </a:t>
+            </a:r>
+            <a:r>
+              <a:rPr lang="en-AU" baseline="0" dirty="0" err="1" smtClean="0"/>
+              <a:t>ove</a:t>
+            </a:r>
+            <a:r>
+              <a:rPr lang="en-AU" baseline="0" dirty="0" smtClean="0"/>
+              <a:t> between cells. Hereby detailing a novel </a:t>
+            </a:r>
+            <a:r>
+              <a:rPr lang="en-AU" baseline="0" dirty="0" err="1" smtClean="0"/>
+              <a:t>echanism</a:t>
+            </a:r>
+            <a:r>
+              <a:rPr lang="en-AU" baseline="0" dirty="0" smtClean="0"/>
+              <a:t> for communication. </a:t>
             </a:r>
             <a:endParaRPr lang="en-AU" dirty="0"/>
           </a:p>
@@ -785,7 +1190,7 @@
           <a:p>
             <a:r>
               <a:rPr lang="en-US" dirty="0" smtClean="0"/>
-              <a:t>Very little</a:t>
+              <a:t>2.15. Very little</a:t>
             </a:r>
             <a:r>
               <a:rPr lang="en-US" baseline="0" dirty="0" smtClean="0"/>
@@ -889,7 +1294,7 @@
           <a:p>
             <a:r>
               <a:rPr lang="en-US" dirty="0" smtClean="0"/>
-              <a:t>Lipid raft composition may be</a:t>
+              <a:t>2.55. Lipid raft composition may be</a:t>
             </a:r>
             <a:r>
               <a:rPr lang="en-US" baseline="0" dirty="0" smtClean="0"/>
@@ -979,6 +1384,10 @@
           <a:bodyPr/>
           <a:lstStyle/>
           <a:p>
+            <a:r>
+              <a:rPr lang="en-AU" dirty="0" smtClean="0"/>
+              <a:t>3.55</a:t>
+            </a:r>
             <a:endParaRPr lang="en-AU" dirty="0"/>
           </a:p>
         </p:txBody>
@@ -1009,7 +1418,7 @@
     </p:spTree>
     <p:extLst>
       <p:ext uri="{BB962C8B-B14F-4D97-AF65-F5344CB8AC3E}">
-        <p14:creationId xmlns:p14="http://schemas.microsoft.com/office/powerpoint/2010/main" val="2920998388"/>
+        <p14:creationId xmlns:p14="http://schemas.microsoft.com/office/powerpoint/2010/main" val="1939772178"/>
       </p:ext>
     </p:extLst>
   </p:cSld>
@@ -1063,29 +1472,10 @@
           <a:bodyPr/>
           <a:lstStyle/>
           <a:p>
-            <a:pPr marL="0" marR="0" indent="0" algn="l" defTabSz="914400" rtl="0" eaLnBrk="1" fontAlgn="auto" latinLnBrk="0" hangingPunct="1">
-              <a:lnSpc>
-                <a:spcPct val="100000"/>
-              </a:lnSpc>
-              <a:spcBef>
-                <a:spcPts val="0"/>
-              </a:spcBef>
-              <a:spcAft>
-                <a:spcPts val="0"/>
-              </a:spcAft>
-              <a:buClrTx/>
-              <a:buSzTx/>
-              <a:buFontTx/>
-              <a:buNone/>
-              <a:tabLst/>
-              <a:defRPr/>
-            </a:pPr>
-            <a:r>
-              <a:rPr lang="en-AU" sz="1200" dirty="0" smtClean="0"/>
-              <a:t>GO:0003723</a:t>
-            </a:r>
-          </a:p>
-          <a:p>
+            <a:r>
+              <a:rPr lang="en-AU" dirty="0" smtClean="0"/>
+              <a:t>4.25</a:t>
+            </a:r>
             <a:endParaRPr lang="en-AU" dirty="0"/>
           </a:p>
         </p:txBody>
@@ -1107,7 +1497,7 @@
           <a:p>
             <a:fld id="{50E92962-0362-434D-A7A6-86BA87293389}" type="slidenum">
               <a:rPr lang="en-AU" smtClean="0"/>
-              <a:t>10</a:t>
+              <a:t>7</a:t>
             </a:fld>
             <a:endParaRPr lang="en-AU"/>
           </a:p>
@@ -1116,7 +1506,7 @@
     </p:spTree>
     <p:extLst>
       <p:ext uri="{BB962C8B-B14F-4D97-AF65-F5344CB8AC3E}">
-        <p14:creationId xmlns:p14="http://schemas.microsoft.com/office/powerpoint/2010/main" val="3382151156"/>
+        <p14:creationId xmlns:p14="http://schemas.microsoft.com/office/powerpoint/2010/main" val="3980211734"/>
       </p:ext>
     </p:extLst>
   </p:cSld>
@@ -1170,6 +1560,10 @@
           <a:bodyPr/>
           <a:lstStyle/>
           <a:p>
+            <a:r>
+              <a:rPr lang="en-AU" dirty="0" smtClean="0"/>
+              <a:t>5.30</a:t>
+            </a:r>
             <a:endParaRPr lang="en-AU" dirty="0"/>
           </a:p>
         </p:txBody>
@@ -1191,7 +1585,7 @@
           <a:p>
             <a:fld id="{50E92962-0362-434D-A7A6-86BA87293389}" type="slidenum">
               <a:rPr lang="en-AU" smtClean="0"/>
-              <a:t>11</a:t>
+              <a:t>8</a:t>
             </a:fld>
             <a:endParaRPr lang="en-AU"/>
           </a:p>
@@ -1200,7 +1594,7 @@
     </p:spTree>
     <p:extLst>
       <p:ext uri="{BB962C8B-B14F-4D97-AF65-F5344CB8AC3E}">
-        <p14:creationId xmlns:p14="http://schemas.microsoft.com/office/powerpoint/2010/main" val="4140009915"/>
+        <p14:creationId xmlns:p14="http://schemas.microsoft.com/office/powerpoint/2010/main" val="2333036110"/>
       </p:ext>
     </p:extLst>
   </p:cSld>
@@ -1254,6 +1648,29 @@
           <a:bodyPr/>
           <a:lstStyle/>
           <a:p>
+            <a:pPr marL="0" marR="0" indent="0" algn="l" defTabSz="914400" rtl="0" eaLnBrk="1" fontAlgn="auto" latinLnBrk="0" hangingPunct="1">
+              <a:lnSpc>
+                <a:spcPct val="100000"/>
+              </a:lnSpc>
+              <a:spcBef>
+                <a:spcPts val="0"/>
+              </a:spcBef>
+              <a:spcAft>
+                <a:spcPts val="0"/>
+              </a:spcAft>
+              <a:buClrTx/>
+              <a:buSzTx/>
+              <a:buFontTx/>
+              <a:buNone/>
+              <a:tabLst/>
+              <a:defRPr/>
+            </a:pPr>
+            <a:r>
+              <a:rPr lang="en-AU" sz="1200" dirty="0" smtClean="0"/>
+              <a:t>6.05. GO:0003723</a:t>
+            </a:r>
+          </a:p>
+          <a:p>
             <a:endParaRPr lang="en-AU" dirty="0"/>
           </a:p>
         </p:txBody>
@@ -1275,7 +1692,7 @@
           <a:p>
             <a:fld id="{50E92962-0362-434D-A7A6-86BA87293389}" type="slidenum">
               <a:rPr lang="en-AU" smtClean="0"/>
-              <a:t>15</a:t>
+              <a:t>9</a:t>
             </a:fld>
             <a:endParaRPr lang="en-AU"/>
           </a:p>
@@ -1284,7 +1701,7 @@
     </p:spTree>
     <p:extLst>
       <p:ext uri="{BB962C8B-B14F-4D97-AF65-F5344CB8AC3E}">
-        <p14:creationId xmlns:p14="http://schemas.microsoft.com/office/powerpoint/2010/main" val="1244007472"/>
+        <p14:creationId xmlns:p14="http://schemas.microsoft.com/office/powerpoint/2010/main" val="3382151156"/>
       </p:ext>
     </p:extLst>
   </p:cSld>
@@ -1425,7 +1842,7 @@
           <a:p>
             <a:fld id="{D006A5F5-722B-4365-93E1-21E835194C29}" type="datetimeFigureOut">
               <a:rPr lang="en-AU" smtClean="0"/>
-              <a:t>22/03/2016</a:t>
+              <a:t>27/03/2016</a:t>
             </a:fld>
             <a:endParaRPr lang="en-AU"/>
           </a:p>
@@ -1595,7 +2012,7 @@
           <a:p>
             <a:fld id="{D006A5F5-722B-4365-93E1-21E835194C29}" type="datetimeFigureOut">
               <a:rPr lang="en-AU" smtClean="0"/>
-              <a:t>22/03/2016</a:t>
+              <a:t>27/03/2016</a:t>
             </a:fld>
             <a:endParaRPr lang="en-AU"/>
           </a:p>
@@ -1775,7 +2192,7 @@
           <a:p>
             <a:fld id="{D006A5F5-722B-4365-93E1-21E835194C29}" type="datetimeFigureOut">
               <a:rPr lang="en-AU" smtClean="0"/>
-              <a:t>22/03/2016</a:t>
+              <a:t>27/03/2016</a:t>
             </a:fld>
             <a:endParaRPr lang="en-AU"/>
           </a:p>
@@ -1945,7 +2362,7 @@
           <a:p>
             <a:fld id="{D006A5F5-722B-4365-93E1-21E835194C29}" type="datetimeFigureOut">
               <a:rPr lang="en-AU" smtClean="0"/>
-              <a:t>22/03/2016</a:t>
+              <a:t>27/03/2016</a:t>
             </a:fld>
             <a:endParaRPr lang="en-AU"/>
           </a:p>
@@ -2191,7 +2608,7 @@
           <a:p>
             <a:fld id="{D006A5F5-722B-4365-93E1-21E835194C29}" type="datetimeFigureOut">
               <a:rPr lang="en-AU" smtClean="0"/>
-              <a:t>22/03/2016</a:t>
+              <a:t>27/03/2016</a:t>
             </a:fld>
             <a:endParaRPr lang="en-AU"/>
           </a:p>
@@ -2423,7 +2840,7 @@
           <a:p>
             <a:fld id="{D006A5F5-722B-4365-93E1-21E835194C29}" type="datetimeFigureOut">
               <a:rPr lang="en-AU" smtClean="0"/>
-              <a:t>22/03/2016</a:t>
+              <a:t>27/03/2016</a:t>
             </a:fld>
             <a:endParaRPr lang="en-AU"/>
           </a:p>
@@ -2790,7 +3207,7 @@
           <a:p>
             <a:fld id="{D006A5F5-722B-4365-93E1-21E835194C29}" type="datetimeFigureOut">
               <a:rPr lang="en-AU" smtClean="0"/>
-              <a:t>22/03/2016</a:t>
+              <a:t>27/03/2016</a:t>
             </a:fld>
             <a:endParaRPr lang="en-AU"/>
           </a:p>
@@ -2908,7 +3325,7 @@
           <a:p>
             <a:fld id="{D006A5F5-722B-4365-93E1-21E835194C29}" type="datetimeFigureOut">
               <a:rPr lang="en-AU" smtClean="0"/>
-              <a:t>22/03/2016</a:t>
+              <a:t>27/03/2016</a:t>
             </a:fld>
             <a:endParaRPr lang="en-AU"/>
           </a:p>
@@ -3003,7 +3420,7 @@
           <a:p>
             <a:fld id="{D006A5F5-722B-4365-93E1-21E835194C29}" type="datetimeFigureOut">
               <a:rPr lang="en-AU" smtClean="0"/>
-              <a:t>22/03/2016</a:t>
+              <a:t>27/03/2016</a:t>
             </a:fld>
             <a:endParaRPr lang="en-AU"/>
           </a:p>
@@ -3280,7 +3697,7 @@
           <a:p>
             <a:fld id="{D006A5F5-722B-4365-93E1-21E835194C29}" type="datetimeFigureOut">
               <a:rPr lang="en-AU" smtClean="0"/>
-              <a:t>22/03/2016</a:t>
+              <a:t>27/03/2016</a:t>
             </a:fld>
             <a:endParaRPr lang="en-AU"/>
           </a:p>
@@ -3537,7 +3954,7 @@
           <a:p>
             <a:fld id="{D006A5F5-722B-4365-93E1-21E835194C29}" type="datetimeFigureOut">
               <a:rPr lang="en-AU" smtClean="0"/>
-              <a:t>22/03/2016</a:t>
+              <a:t>27/03/2016</a:t>
             </a:fld>
             <a:endParaRPr lang="en-AU"/>
           </a:p>
@@ -3759,7 +4176,7 @@
           <a:p>
             <a:fld id="{D006A5F5-722B-4365-93E1-21E835194C29}" type="datetimeFigureOut">
               <a:rPr lang="en-AU" smtClean="0"/>
-              <a:t>22/03/2016</a:t>
+              <a:t>27/03/2016</a:t>
             </a:fld>
             <a:endParaRPr lang="en-AU"/>
           </a:p>
@@ -4317,263 +4734,6 @@
             <p:ph type="title"/>
           </p:nvPr>
         </p:nvSpPr>
-        <p:spPr/>
-        <p:txBody>
-          <a:bodyPr>
-            <a:normAutofit/>
-          </a:bodyPr>
-          <a:lstStyle/>
-          <a:p>
-            <a:r>
-              <a:rPr lang="en-AU" sz="4000" b="1" dirty="0" smtClean="0">
-                <a:solidFill>
-                  <a:schemeClr val="bg1"/>
-                </a:solidFill>
-              </a:rPr>
-              <a:t>Aim 2: Identify </a:t>
-            </a:r>
-            <a:r>
-              <a:rPr lang="en-AU" sz="4000" b="1" dirty="0" smtClean="0">
-                <a:solidFill>
-                  <a:schemeClr val="bg1"/>
-                </a:solidFill>
-              </a:rPr>
-              <a:t>Candidate </a:t>
-            </a:r>
-            <a:r>
-              <a:rPr lang="en-AU" sz="4000" b="1" dirty="0" err="1" smtClean="0">
-                <a:solidFill>
-                  <a:schemeClr val="bg1"/>
-                </a:solidFill>
-              </a:rPr>
-              <a:t>miR</a:t>
-            </a:r>
-            <a:r>
-              <a:rPr lang="en-AU" sz="4000" b="1" dirty="0" smtClean="0">
-                <a:solidFill>
-                  <a:schemeClr val="bg1"/>
-                </a:solidFill>
-              </a:rPr>
-              <a:t> </a:t>
-            </a:r>
-            <a:r>
-              <a:rPr lang="en-AU" sz="4000" b="1" dirty="0" smtClean="0">
-                <a:solidFill>
-                  <a:schemeClr val="bg1"/>
-                </a:solidFill>
-              </a:rPr>
-              <a:t>Binding </a:t>
-            </a:r>
-            <a:r>
-              <a:rPr lang="en-AU" sz="4000" b="1" dirty="0">
-                <a:solidFill>
-                  <a:schemeClr val="bg1"/>
-                </a:solidFill>
-              </a:rPr>
-              <a:t>P</a:t>
-            </a:r>
-            <a:r>
-              <a:rPr lang="en-AU" sz="4000" b="1" dirty="0" smtClean="0">
-                <a:solidFill>
-                  <a:schemeClr val="bg1"/>
-                </a:solidFill>
-              </a:rPr>
-              <a:t>roteins</a:t>
-            </a:r>
-            <a:r>
-              <a:rPr lang="en-AU" sz="4000" b="1" dirty="0" smtClean="0">
-                <a:solidFill>
-                  <a:schemeClr val="bg1"/>
-                </a:solidFill>
-              </a:rPr>
-              <a:t>.</a:t>
-            </a:r>
-            <a:endParaRPr lang="en-AU" sz="4000" b="1" dirty="0">
-              <a:solidFill>
-                <a:schemeClr val="bg1"/>
-              </a:solidFill>
-            </a:endParaRPr>
-          </a:p>
-        </p:txBody>
-      </p:sp>
-      <p:sp>
-        <p:nvSpPr>
-          <p:cNvPr id="3" name="Content Placeholder 2"/>
-          <p:cNvSpPr>
-            <a:spLocks noGrp="1"/>
-          </p:cNvSpPr>
-          <p:nvPr>
-            <p:ph idx="1"/>
-          </p:nvPr>
-        </p:nvSpPr>
-        <p:spPr>
-          <a:xfrm>
-            <a:off x="838200" y="1583140"/>
-            <a:ext cx="5729216" cy="4593823"/>
-          </a:xfrm>
-        </p:spPr>
-        <p:txBody>
-          <a:bodyPr>
-            <a:normAutofit fontScale="92500" lnSpcReduction="20000"/>
-          </a:bodyPr>
-          <a:lstStyle/>
-          <a:p>
-            <a:pPr marL="0" indent="0">
-              <a:buNone/>
-            </a:pPr>
-            <a:r>
-              <a:rPr lang="en-AU" b="1" dirty="0" smtClean="0"/>
-              <a:t>Method 1: Computational analysis. </a:t>
-            </a:r>
-          </a:p>
-          <a:p>
-            <a:pPr marL="0" indent="0">
-              <a:buNone/>
-            </a:pPr>
-            <a:endParaRPr lang="en-AU" sz="2200" dirty="0" smtClean="0"/>
-          </a:p>
-          <a:p>
-            <a:pPr>
-              <a:lnSpc>
-                <a:spcPct val="100000"/>
-              </a:lnSpc>
-            </a:pPr>
-            <a:r>
-              <a:rPr lang="en-AU" sz="2600" dirty="0"/>
-              <a:t>P</a:t>
-            </a:r>
-            <a:r>
-              <a:rPr lang="en-AU" sz="2600" dirty="0" smtClean="0"/>
-              <a:t>roteomics data collected for the lipid raft, total membrane and EVs for PC3 GFP and PC3 cavin-1 cells. </a:t>
-            </a:r>
-          </a:p>
-          <a:p>
-            <a:pPr marL="0" indent="0">
-              <a:lnSpc>
-                <a:spcPct val="100000"/>
-              </a:lnSpc>
-              <a:buNone/>
-            </a:pPr>
-            <a:endParaRPr lang="en-AU" sz="2600" dirty="0" smtClean="0"/>
-          </a:p>
-          <a:p>
-            <a:pPr>
-              <a:lnSpc>
-                <a:spcPct val="100000"/>
-              </a:lnSpc>
-            </a:pPr>
-            <a:r>
-              <a:rPr lang="en-US" sz="2600" dirty="0" smtClean="0"/>
-              <a:t>Identify proteins enriched in the EV fraction correlating to an increase of </a:t>
-            </a:r>
-            <a:r>
-              <a:rPr lang="en-US" sz="2600" dirty="0" err="1" smtClean="0"/>
-              <a:t>miR</a:t>
-            </a:r>
-            <a:r>
-              <a:rPr lang="en-US" sz="2600" dirty="0" smtClean="0"/>
-              <a:t> export.</a:t>
-            </a:r>
-          </a:p>
-          <a:p>
-            <a:pPr>
-              <a:lnSpc>
-                <a:spcPct val="100000"/>
-              </a:lnSpc>
-            </a:pPr>
-            <a:endParaRPr lang="en-US" sz="2600" dirty="0" smtClean="0"/>
-          </a:p>
-          <a:p>
-            <a:pPr>
-              <a:lnSpc>
-                <a:spcPct val="100000"/>
-              </a:lnSpc>
-            </a:pPr>
-            <a:r>
-              <a:rPr lang="en-US" sz="2600" dirty="0" smtClean="0"/>
-              <a:t>Gene Ontology analysis determines RNA-binding ability. </a:t>
-            </a:r>
-            <a:endParaRPr lang="en-AU" sz="3500" dirty="0"/>
-          </a:p>
-        </p:txBody>
-      </p:sp>
-      <p:pic>
-        <p:nvPicPr>
-          <p:cNvPr id="7" name="Picture 6"/>
-          <p:cNvPicPr>
-            <a:picLocks noChangeAspect="1"/>
-          </p:cNvPicPr>
-          <p:nvPr/>
-        </p:nvPicPr>
-        <p:blipFill>
-          <a:blip r:embed="rId3">
-            <a:extLst>
-              <a:ext uri="{28A0092B-C50C-407E-A947-70E740481C1C}">
-                <a14:useLocalDpi xmlns:a14="http://schemas.microsoft.com/office/drawing/2010/main" val="0"/>
-              </a:ext>
-            </a:extLst>
-          </a:blip>
-          <a:stretch>
-            <a:fillRect/>
-          </a:stretch>
-        </p:blipFill>
-        <p:spPr>
-          <a:xfrm>
-            <a:off x="6632153" y="2222784"/>
-            <a:ext cx="5239481" cy="2962688"/>
-          </a:xfrm>
-          <a:prstGeom prst="rect">
-            <a:avLst/>
-          </a:prstGeom>
-        </p:spPr>
-      </p:pic>
-    </p:spTree>
-    <p:extLst>
-      <p:ext uri="{BB962C8B-B14F-4D97-AF65-F5344CB8AC3E}">
-        <p14:creationId xmlns:p14="http://schemas.microsoft.com/office/powerpoint/2010/main" val="347616013"/>
-      </p:ext>
-    </p:extLst>
-  </p:cSld>
-  <p:clrMapOvr>
-    <a:masterClrMapping/>
-  </p:clrMapOvr>
-  <p:timing>
-    <p:tnLst>
-      <p:par>
-        <p:cTn id="1" dur="indefinite" restart="never" nodeType="tmRoot"/>
-      </p:par>
-    </p:tnLst>
-  </p:timing>
-</p:sld>
-</file>
-
-<file path=ppt/slides/slide11.xml><?xml version="1.0" encoding="utf-8"?>
-<p:sld xmlns:a="http://schemas.openxmlformats.org/drawingml/2006/main" xmlns:r="http://schemas.openxmlformats.org/officeDocument/2006/relationships" xmlns:p="http://schemas.openxmlformats.org/presentationml/2006/main">
-  <p:cSld>
-    <p:spTree>
-      <p:nvGrpSpPr>
-        <p:cNvPr id="1" name=""/>
-        <p:cNvGrpSpPr/>
-        <p:nvPr/>
-      </p:nvGrpSpPr>
-      <p:grpSpPr>
-        <a:xfrm>
-          <a:off x="0" y="0"/>
-          <a:ext cx="0" cy="0"/>
-          <a:chOff x="0" y="0"/>
-          <a:chExt cx="0" cy="0"/>
-        </a:xfrm>
-      </p:grpSpPr>
-      <p:sp>
-        <p:nvSpPr>
-          <p:cNvPr id="2" name="Title 1"/>
-          <p:cNvSpPr>
-            <a:spLocks noGrp="1"/>
-          </p:cNvSpPr>
-          <p:nvPr>
-            <p:ph type="title"/>
-          </p:nvPr>
-        </p:nvSpPr>
         <p:spPr>
           <a:xfrm>
             <a:off x="551768" y="311362"/>
@@ -4624,15 +4784,7 @@
                   <a:schemeClr val="bg1"/>
                 </a:solidFill>
               </a:rPr>
-              <a:t> </a:t>
-            </a:r>
-            <a:r>
-              <a:rPr lang="en-AU" sz="3600" b="1" dirty="0">
-                <a:solidFill>
-                  <a:schemeClr val="bg1"/>
-                </a:solidFill>
-              </a:rPr>
-              <a:t>B</a:t>
+              <a:t> B</a:t>
             </a:r>
             <a:r>
               <a:rPr lang="en-AU" sz="3600" b="1" dirty="0" smtClean="0">
@@ -4656,15 +4808,7 @@
                   <a:schemeClr val="bg1"/>
                 </a:solidFill>
               </a:rPr>
-              <a:t>roteins</a:t>
-            </a:r>
-            <a:r>
-              <a:rPr lang="en-AU" sz="3600" b="1" dirty="0" smtClean="0">
-                <a:solidFill>
-                  <a:schemeClr val="bg1"/>
-                </a:solidFill>
-              </a:rPr>
-              <a:t>. </a:t>
+              <a:t>roteins. </a:t>
             </a:r>
             <a:endParaRPr lang="en-AU" sz="3600" b="1" dirty="0">
               <a:solidFill>
@@ -5043,7 +5187,7 @@
 </p:sld>
 </file>
 
-<file path=ppt/slides/slide12.xml><?xml version="1.0" encoding="utf-8"?>
+<file path=ppt/slides/slide11.xml><?xml version="1.0" encoding="utf-8"?>
 <p:sld xmlns:a="http://schemas.openxmlformats.org/drawingml/2006/main" xmlns:r="http://schemas.openxmlformats.org/officeDocument/2006/relationships" xmlns:p="http://schemas.openxmlformats.org/presentationml/2006/main">
   <p:cSld>
     <p:spTree>
@@ -5126,7 +5270,7 @@
               <a:buNone/>
             </a:pPr>
             <a:r>
-              <a:rPr lang="en-AU" dirty="0" smtClean="0"/>
+              <a:rPr lang="en-AU" b="1" dirty="0" smtClean="0"/>
               <a:t>Method 1: Pull down assay</a:t>
             </a:r>
           </a:p>
@@ -5140,22 +5284,22 @@
       </p:sp>
       <p:pic>
         <p:nvPicPr>
-          <p:cNvPr id="7" name="Picture 6"/>
+          <p:cNvPr id="4" name="Picture 3"/>
           <p:cNvPicPr>
             <a:picLocks noChangeAspect="1"/>
           </p:cNvPicPr>
           <p:nvPr/>
         </p:nvPicPr>
         <p:blipFill>
-          <a:blip r:embed="rId2"/>
+          <a:blip r:embed="rId3"/>
           <a:stretch>
             <a:fillRect/>
           </a:stretch>
         </p:blipFill>
         <p:spPr>
           <a:xfrm>
-            <a:off x="1123950" y="2397125"/>
-            <a:ext cx="9944100" cy="3914775"/>
+            <a:off x="1123950" y="2378075"/>
+            <a:ext cx="9944100" cy="3933825"/>
           </a:xfrm>
           <a:prstGeom prst="rect">
             <a:avLst/>
@@ -5182,7 +5326,7 @@
 </p:sld>
 </file>
 
-<file path=ppt/slides/slide13.xml><?xml version="1.0" encoding="utf-8"?>
+<file path=ppt/slides/slide12.xml><?xml version="1.0" encoding="utf-8"?>
 <p:sld xmlns:a="http://schemas.openxmlformats.org/drawingml/2006/main" xmlns:r="http://schemas.openxmlformats.org/officeDocument/2006/relationships" xmlns:p="http://schemas.openxmlformats.org/presentationml/2006/main">
   <p:cSld>
     <p:spTree>
@@ -5293,8 +5437,12 @@
               <a:buNone/>
             </a:pPr>
             <a:r>
+              <a:rPr lang="en-AU" b="1" dirty="0" smtClean="0"/>
+              <a:t>Method 2: Co-localisation </a:t>
+            </a:r>
+            <a:r>
               <a:rPr lang="en-AU" dirty="0" smtClean="0"/>
-              <a:t>Method 2: Co-localisation by Immunofluorescence Confocal Microscopy</a:t>
+              <a:t>by Immunofluorescence Confocal Microscopy</a:t>
             </a:r>
             <a:endParaRPr lang="en-AU" dirty="0"/>
           </a:p>
@@ -5349,7 +5497,7 @@
             </a:pPr>
             <a:r>
               <a:rPr lang="en-US" sz="2800" dirty="0" smtClean="0"/>
-              <a:t>Co-localized miRNA + protein will be visualized as yellow. </a:t>
+              <a:t>Co-localized miRNA + protein will be observed as yellow. </a:t>
             </a:r>
           </a:p>
           <a:p>
@@ -5404,7 +5552,7 @@
 </p:sld>
 </file>
 
-<file path=ppt/slides/slide14.xml><?xml version="1.0" encoding="utf-8"?>
+<file path=ppt/slides/slide13.xml><?xml version="1.0" encoding="utf-8"?>
 <p:sld xmlns:a="http://schemas.openxmlformats.org/drawingml/2006/main" xmlns:r="http://schemas.openxmlformats.org/officeDocument/2006/relationships" xmlns:p="http://schemas.openxmlformats.org/presentationml/2006/main">
   <p:cSld>
     <p:spTree>
@@ -5476,11 +5624,15 @@
           <a:p>
             <a:r>
               <a:rPr lang="en-US" dirty="0" smtClean="0"/>
-              <a:t>Novel mechanism of miRNA </a:t>
+              <a:t>Novel </a:t>
+            </a:r>
+            <a:r>
+              <a:rPr lang="en-US" dirty="0" err="1" smtClean="0"/>
+              <a:t>miRNA</a:t>
             </a:r>
             <a:r>
               <a:rPr lang="en-US" dirty="0" smtClean="0"/>
-              <a:t>function</a:t>
+              <a:t> function</a:t>
             </a:r>
           </a:p>
           <a:p>
@@ -5494,7 +5646,6 @@
               <a:rPr lang="en-US" dirty="0" smtClean="0"/>
               <a:t>Irregularities in sorting can cause dysfunction in recipient cells.</a:t>
             </a:r>
-            <a:endParaRPr lang="en-US" dirty="0" smtClean="0"/>
           </a:p>
           <a:p>
             <a:pPr marL="0" indent="0">
@@ -5505,11 +5656,7 @@
           <a:p>
             <a:r>
               <a:rPr lang="en-US" dirty="0" smtClean="0"/>
-              <a:t>MiRNAs </a:t>
-            </a:r>
-            <a:r>
-              <a:rPr lang="en-US" dirty="0" smtClean="0"/>
-              <a:t>exported within EVs have been linked to cancer metastasis </a:t>
+              <a:t>MiRNAs exported within EVs have been linked to cancer metastasis </a:t>
             </a:r>
           </a:p>
           <a:p>
@@ -5587,8 +5734,8 @@
         </p:nvSpPr>
         <p:spPr>
           <a:xfrm>
-            <a:off x="8126960" y="1652716"/>
-            <a:ext cx="3049040" cy="461665"/>
+            <a:off x="7987366" y="1482724"/>
+            <a:ext cx="2841740" cy="707886"/>
           </a:xfrm>
           <a:prstGeom prst="rect">
             <a:avLst/>
@@ -5602,10 +5749,16 @@
           <a:lstStyle/>
           <a:p>
             <a:r>
-              <a:rPr lang="en-US" sz="2400" dirty="0" smtClean="0"/>
-              <a:t>Increases proliferation.</a:t>
-            </a:r>
-            <a:endParaRPr lang="en-AU" sz="2400" dirty="0"/>
+              <a:rPr lang="en-US" sz="2000" dirty="0" smtClean="0"/>
+              <a:t>Increases proliferation of </a:t>
+            </a:r>
+          </a:p>
+          <a:p>
+            <a:r>
+              <a:rPr lang="en-US" sz="2000" dirty="0" smtClean="0"/>
+              <a:t>Osteoblast.</a:t>
+            </a:r>
+            <a:endParaRPr lang="en-AU" sz="2000" dirty="0"/>
           </a:p>
         </p:txBody>
       </p:sp>
@@ -5629,7 +5782,7 @@
 </p:sld>
 </file>
 
-<file path=ppt/slides/slide15.xml><?xml version="1.0" encoding="utf-8"?>
+<file path=ppt/slides/slide14.xml><?xml version="1.0" encoding="utf-8"?>
 <p:sld xmlns:a="http://schemas.openxmlformats.org/drawingml/2006/main" xmlns:r="http://schemas.openxmlformats.org/officeDocument/2006/relationships" xmlns:p="http://schemas.openxmlformats.org/presentationml/2006/main">
   <p:cSld>
     <p:spTree>
@@ -5847,6 +6000,744 @@
   <p:clrMapOvr>
     <a:masterClrMapping/>
   </p:clrMapOvr>
+  <p:timing>
+    <p:tnLst>
+      <p:par>
+        <p:cTn id="1" dur="indefinite" restart="never" nodeType="tmRoot"/>
+      </p:par>
+    </p:tnLst>
+  </p:timing>
+</p:sld>
+</file>
+
+<file path=ppt/slides/slide15.xml><?xml version="1.0" encoding="utf-8"?>
+<p:sld xmlns:a="http://schemas.openxmlformats.org/drawingml/2006/main" xmlns:r="http://schemas.openxmlformats.org/officeDocument/2006/relationships" xmlns:p="http://schemas.openxmlformats.org/presentationml/2006/main">
+  <p:cSld>
+    <p:spTree>
+      <p:nvGrpSpPr>
+        <p:cNvPr id="1" name=""/>
+        <p:cNvGrpSpPr/>
+        <p:nvPr/>
+      </p:nvGrpSpPr>
+      <p:grpSpPr>
+        <a:xfrm>
+          <a:off x="0" y="0"/>
+          <a:ext cx="0" cy="0"/>
+          <a:chOff x="0" y="0"/>
+          <a:chExt cx="0" cy="0"/>
+        </a:xfrm>
+      </p:grpSpPr>
+      <p:sp>
+        <p:nvSpPr>
+          <p:cNvPr id="2" name="Title 1"/>
+          <p:cNvSpPr>
+            <a:spLocks noGrp="1"/>
+          </p:cNvSpPr>
+          <p:nvPr>
+            <p:ph type="title"/>
+          </p:nvPr>
+        </p:nvSpPr>
+        <p:spPr/>
+        <p:txBody>
+          <a:bodyPr/>
+          <a:lstStyle/>
+          <a:p>
+            <a:r>
+              <a:rPr lang="en-US" dirty="0" smtClean="0">
+                <a:solidFill>
+                  <a:schemeClr val="bg1"/>
+                </a:solidFill>
+              </a:rPr>
+              <a:t>DESeq2 </a:t>
+            </a:r>
+            <a:r>
+              <a:rPr lang="en-US" dirty="0" err="1" smtClean="0">
+                <a:solidFill>
+                  <a:schemeClr val="bg1"/>
+                </a:solidFill>
+              </a:rPr>
+              <a:t>EdgeR</a:t>
+            </a:r>
+            <a:r>
+              <a:rPr lang="en-US" dirty="0" smtClean="0">
+                <a:solidFill>
+                  <a:schemeClr val="bg1"/>
+                </a:solidFill>
+              </a:rPr>
+              <a:t> method</a:t>
+            </a:r>
+            <a:endParaRPr lang="en-AU" dirty="0">
+              <a:solidFill>
+                <a:schemeClr val="bg1"/>
+              </a:solidFill>
+            </a:endParaRPr>
+          </a:p>
+        </p:txBody>
+      </p:sp>
+      <p:sp>
+        <p:nvSpPr>
+          <p:cNvPr id="3" name="Content Placeholder 2"/>
+          <p:cNvSpPr>
+            <a:spLocks noGrp="1"/>
+          </p:cNvSpPr>
+          <p:nvPr>
+            <p:ph idx="1"/>
+          </p:nvPr>
+        </p:nvSpPr>
+        <p:spPr>
+          <a:xfrm>
+            <a:off x="838199" y="1825625"/>
+            <a:ext cx="10515601" cy="4351338"/>
+          </a:xfrm>
+        </p:spPr>
+        <p:txBody>
+          <a:bodyPr>
+            <a:noAutofit/>
+          </a:bodyPr>
+          <a:lstStyle/>
+          <a:p>
+            <a:pPr marL="0" indent="0">
+              <a:buNone/>
+            </a:pPr>
+            <a:r>
+              <a:rPr lang="en-US" sz="2400" b="1" dirty="0" smtClean="0"/>
+              <a:t>Differential expression method</a:t>
+            </a:r>
+            <a:r>
+              <a:rPr lang="en-US" sz="2400" dirty="0" smtClean="0"/>
+              <a:t>: Input RNA-</a:t>
+            </a:r>
+            <a:r>
+              <a:rPr lang="en-US" sz="2400" dirty="0" err="1" smtClean="0"/>
+              <a:t>seq</a:t>
+            </a:r>
+            <a:r>
+              <a:rPr lang="en-US" sz="2400" dirty="0" smtClean="0"/>
+              <a:t> raw counts -&gt; Filter out low-no reads and normalize -&gt; </a:t>
+            </a:r>
+            <a:r>
+              <a:rPr lang="en-US" sz="2400" dirty="0" smtClean="0"/>
+              <a:t>Establis</a:t>
+            </a:r>
+            <a:r>
+              <a:rPr lang="en-US" sz="2400" dirty="0" smtClean="0"/>
+              <a:t>h design -&gt; </a:t>
+            </a:r>
+            <a:r>
+              <a:rPr lang="en-US" sz="2400" dirty="0" smtClean="0"/>
+              <a:t>Differential </a:t>
+            </a:r>
+            <a:r>
+              <a:rPr lang="en-US" sz="2400" dirty="0" smtClean="0"/>
+              <a:t>expression analysis (</a:t>
+            </a:r>
+            <a:r>
+              <a:rPr lang="en-US" sz="2400" dirty="0" err="1" smtClean="0"/>
+              <a:t>DESeq</a:t>
+            </a:r>
+            <a:r>
+              <a:rPr lang="en-US" sz="2400" dirty="0" smtClean="0"/>
+              <a:t>(list) function) -&gt; Returns log2fold </a:t>
+            </a:r>
+            <a:r>
+              <a:rPr lang="en-US" sz="2400" dirty="0" smtClean="0"/>
+              <a:t>change , </a:t>
+            </a:r>
+            <a:r>
+              <a:rPr lang="en-US" sz="2400" dirty="0" smtClean="0"/>
+              <a:t>p-values, and Adjusted p values. </a:t>
+            </a:r>
+          </a:p>
+          <a:p>
+            <a:pPr marL="0" indent="0">
+              <a:buNone/>
+            </a:pPr>
+            <a:r>
+              <a:rPr lang="en-US" sz="2400" b="1" dirty="0" smtClean="0"/>
+              <a:t>Data </a:t>
+            </a:r>
+            <a:r>
+              <a:rPr lang="en-US" sz="2400" b="1" dirty="0"/>
+              <a:t>q</a:t>
+            </a:r>
+            <a:r>
+              <a:rPr lang="en-US" sz="2400" b="1" dirty="0" smtClean="0"/>
+              <a:t>uality assessment</a:t>
+            </a:r>
+            <a:r>
+              <a:rPr lang="en-US" sz="2400" dirty="0" smtClean="0"/>
+              <a:t>: MDS plot, </a:t>
+            </a:r>
+            <a:r>
+              <a:rPr lang="en-US" sz="2400" dirty="0" err="1" smtClean="0"/>
+              <a:t>dendrogram</a:t>
+            </a:r>
+            <a:r>
+              <a:rPr lang="en-US" sz="2400" dirty="0" smtClean="0"/>
+              <a:t>, PCA plot</a:t>
+            </a:r>
+          </a:p>
+          <a:p>
+            <a:pPr marL="0" indent="0">
+              <a:buNone/>
+            </a:pPr>
+            <a:r>
+              <a:rPr lang="en-US" sz="2400" b="1" dirty="0" smtClean="0"/>
+              <a:t>Comparisons:</a:t>
+            </a:r>
+          </a:p>
+          <a:p>
+            <a:pPr marL="0" indent="0">
+              <a:buNone/>
+            </a:pPr>
+            <a:r>
+              <a:rPr lang="en-US" sz="2400" dirty="0" smtClean="0"/>
+              <a:t>-  PC3 EV vs PC3 Cavin-1 EV = FC of miRNAs differentially exported due to lipid raft change. </a:t>
+            </a:r>
+          </a:p>
+          <a:p>
+            <a:pPr>
+              <a:buFontTx/>
+              <a:buChar char="-"/>
+            </a:pPr>
+            <a:r>
+              <a:rPr lang="en-US" sz="2400" dirty="0" smtClean="0"/>
+              <a:t>PC3 cell </a:t>
+            </a:r>
+            <a:r>
+              <a:rPr lang="en-US" sz="2400" dirty="0" err="1" smtClean="0"/>
+              <a:t>miRs</a:t>
+            </a:r>
+            <a:r>
+              <a:rPr lang="en-US" sz="2400" dirty="0" smtClean="0"/>
+              <a:t> vs PC3 Cavin-1 </a:t>
+            </a:r>
+            <a:r>
+              <a:rPr lang="en-US" sz="2400" dirty="0" err="1" smtClean="0"/>
+              <a:t>miRs</a:t>
+            </a:r>
+            <a:r>
+              <a:rPr lang="en-US" sz="2400" dirty="0" smtClean="0"/>
+              <a:t> = FC of miRNAs differentially expressed due to cavin-1 introduction</a:t>
+            </a:r>
+          </a:p>
+          <a:p>
+            <a:pPr marL="0" indent="0">
+              <a:buNone/>
+            </a:pPr>
+            <a:r>
+              <a:rPr lang="en-US" sz="2400" b="1" dirty="0" smtClean="0"/>
+              <a:t>Selectively exported </a:t>
+            </a:r>
+            <a:r>
+              <a:rPr lang="en-US" sz="2400" b="1" dirty="0" err="1" smtClean="0"/>
+              <a:t>miRs</a:t>
+            </a:r>
+            <a:r>
+              <a:rPr lang="en-US" sz="2400" b="1" dirty="0" smtClean="0"/>
+              <a:t>: </a:t>
+            </a:r>
+            <a:r>
+              <a:rPr lang="en-US" sz="2400" dirty="0" smtClean="0"/>
+              <a:t>Compare FC(cell) / FC (</a:t>
+            </a:r>
+            <a:r>
+              <a:rPr lang="en-US" sz="2400" dirty="0" err="1" smtClean="0"/>
+              <a:t>exo</a:t>
+            </a:r>
+            <a:r>
+              <a:rPr lang="en-US" sz="2400" dirty="0" smtClean="0"/>
+              <a:t>). If ~ 1, then non-selective. Else: Selective</a:t>
+            </a:r>
+            <a:endParaRPr lang="en-AU" sz="2400" dirty="0"/>
+          </a:p>
+        </p:txBody>
+      </p:sp>
+    </p:spTree>
+    <p:extLst>
+      <p:ext uri="{BB962C8B-B14F-4D97-AF65-F5344CB8AC3E}">
+        <p14:creationId xmlns:p14="http://schemas.microsoft.com/office/powerpoint/2010/main" val="81344765"/>
+      </p:ext>
+    </p:extLst>
+  </p:cSld>
+  <p:clrMapOvr>
+    <a:masterClrMapping/>
+  </p:clrMapOvr>
+  <p:timing>
+    <p:tnLst>
+      <p:par>
+        <p:cTn id="1" dur="indefinite" restart="never" nodeType="tmRoot"/>
+      </p:par>
+    </p:tnLst>
+  </p:timing>
+</p:sld>
+</file>
+
+<file path=ppt/slides/slide16.xml><?xml version="1.0" encoding="utf-8"?>
+<p:sld xmlns:a="http://schemas.openxmlformats.org/drawingml/2006/main" xmlns:r="http://schemas.openxmlformats.org/officeDocument/2006/relationships" xmlns:p="http://schemas.openxmlformats.org/presentationml/2006/main">
+  <p:cSld>
+    <p:spTree>
+      <p:nvGrpSpPr>
+        <p:cNvPr id="1" name=""/>
+        <p:cNvGrpSpPr/>
+        <p:nvPr/>
+      </p:nvGrpSpPr>
+      <p:grpSpPr>
+        <a:xfrm>
+          <a:off x="0" y="0"/>
+          <a:ext cx="0" cy="0"/>
+          <a:chOff x="0" y="0"/>
+          <a:chExt cx="0" cy="0"/>
+        </a:xfrm>
+      </p:grpSpPr>
+      <p:sp>
+        <p:nvSpPr>
+          <p:cNvPr id="2" name="Title 1"/>
+          <p:cNvSpPr>
+            <a:spLocks noGrp="1"/>
+          </p:cNvSpPr>
+          <p:nvPr>
+            <p:ph type="title"/>
+          </p:nvPr>
+        </p:nvSpPr>
+        <p:spPr/>
+        <p:txBody>
+          <a:bodyPr/>
+          <a:lstStyle/>
+          <a:p>
+            <a:r>
+              <a:rPr lang="en-US" dirty="0" smtClean="0">
+                <a:solidFill>
+                  <a:schemeClr val="bg1"/>
+                </a:solidFill>
+              </a:rPr>
+              <a:t>Motif Scan</a:t>
+            </a:r>
+            <a:endParaRPr lang="en-AU" dirty="0">
+              <a:solidFill>
+                <a:schemeClr val="bg1"/>
+              </a:solidFill>
+            </a:endParaRPr>
+          </a:p>
+        </p:txBody>
+      </p:sp>
+      <p:graphicFrame>
+        <p:nvGraphicFramePr>
+          <p:cNvPr id="7" name="Content Placeholder 6"/>
+          <p:cNvGraphicFramePr>
+            <a:graphicFrameLocks noGrp="1"/>
+          </p:cNvGraphicFramePr>
+          <p:nvPr>
+            <p:ph idx="1"/>
+            <p:extLst>
+              <p:ext uri="{D42A27DB-BD31-4B8C-83A1-F6EECF244321}">
+                <p14:modId xmlns:p14="http://schemas.microsoft.com/office/powerpoint/2010/main" val="1667987295"/>
+              </p:ext>
+            </p:extLst>
+          </p:nvPr>
+        </p:nvGraphicFramePr>
+        <p:xfrm>
+          <a:off x="984504" y="1976115"/>
+          <a:ext cx="3664790" cy="1483360"/>
+        </p:xfrm>
+        <a:graphic>
+          <a:graphicData uri="http://schemas.openxmlformats.org/drawingml/2006/table">
+            <a:tbl>
+              <a:tblPr firstRow="1" bandRow="1">
+                <a:tableStyleId>{5940675A-B579-460E-94D1-54222C63F5DA}</a:tableStyleId>
+              </a:tblPr>
+              <a:tblGrid>
+                <a:gridCol w="343619"/>
+                <a:gridCol w="836762"/>
+                <a:gridCol w="629728"/>
+                <a:gridCol w="698740"/>
+                <a:gridCol w="1155941"/>
+              </a:tblGrid>
+              <a:tr h="370840">
+                <a:tc>
+                  <a:txBody>
+                    <a:bodyPr/>
+                    <a:lstStyle/>
+                    <a:p>
+                      <a:r>
+                        <a:rPr lang="en-US" dirty="0" smtClean="0"/>
+                        <a:t>G</a:t>
+                      </a:r>
+                      <a:endParaRPr lang="en-AU" dirty="0"/>
+                    </a:p>
+                  </a:txBody>
+                  <a:tcPr/>
+                </a:tc>
+                <a:tc>
+                  <a:txBody>
+                    <a:bodyPr/>
+                    <a:lstStyle/>
+                    <a:p>
+                      <a:r>
+                        <a:rPr lang="en-US" dirty="0" smtClean="0"/>
+                        <a:t>0.495</a:t>
+                      </a:r>
+                      <a:endParaRPr lang="en-AU" dirty="0"/>
+                    </a:p>
+                  </a:txBody>
+                  <a:tcPr>
+                    <a:solidFill>
+                      <a:schemeClr val="bg1">
+                        <a:lumMod val="65000"/>
+                        <a:lumOff val="35000"/>
+                      </a:schemeClr>
+                    </a:solidFill>
+                  </a:tcPr>
+                </a:tc>
+                <a:tc>
+                  <a:txBody>
+                    <a:bodyPr/>
+                    <a:lstStyle/>
+                    <a:p>
+                      <a:r>
+                        <a:rPr lang="en-US" dirty="0" smtClean="0"/>
+                        <a:t>0.97</a:t>
+                      </a:r>
+                      <a:endParaRPr lang="en-AU" dirty="0"/>
+                    </a:p>
+                  </a:txBody>
+                  <a:tcPr>
+                    <a:solidFill>
+                      <a:schemeClr val="bg1">
+                        <a:lumMod val="65000"/>
+                        <a:lumOff val="35000"/>
+                      </a:schemeClr>
+                    </a:solidFill>
+                  </a:tcPr>
+                </a:tc>
+                <a:tc>
+                  <a:txBody>
+                    <a:bodyPr/>
+                    <a:lstStyle/>
+                    <a:p>
+                      <a:r>
+                        <a:rPr lang="en-US" dirty="0" smtClean="0"/>
+                        <a:t>0.29</a:t>
+                      </a:r>
+                      <a:endParaRPr lang="en-AU" dirty="0"/>
+                    </a:p>
+                  </a:txBody>
+                  <a:tcPr/>
+                </a:tc>
+                <a:tc>
+                  <a:txBody>
+                    <a:bodyPr/>
+                    <a:lstStyle/>
+                    <a:p>
+                      <a:r>
+                        <a:rPr lang="en-US" dirty="0" smtClean="0"/>
+                        <a:t>0.74</a:t>
+                      </a:r>
+                      <a:endParaRPr lang="en-AU" dirty="0"/>
+                    </a:p>
+                  </a:txBody>
+                  <a:tcPr>
+                    <a:solidFill>
+                      <a:schemeClr val="bg1">
+                        <a:lumMod val="65000"/>
+                        <a:lumOff val="35000"/>
+                      </a:schemeClr>
+                    </a:solidFill>
+                  </a:tcPr>
+                </a:tc>
+              </a:tr>
+              <a:tr h="370840">
+                <a:tc>
+                  <a:txBody>
+                    <a:bodyPr/>
+                    <a:lstStyle/>
+                    <a:p>
+                      <a:r>
+                        <a:rPr lang="en-US" dirty="0" smtClean="0"/>
+                        <a:t>C</a:t>
+                      </a:r>
+                      <a:endParaRPr lang="en-AU" dirty="0"/>
+                    </a:p>
+                  </a:txBody>
+                  <a:tcPr/>
+                </a:tc>
+                <a:tc>
+                  <a:txBody>
+                    <a:bodyPr/>
+                    <a:lstStyle/>
+                    <a:p>
+                      <a:r>
+                        <a:rPr lang="en-US" dirty="0" smtClean="0"/>
+                        <a:t>0.099</a:t>
+                      </a:r>
+                      <a:endParaRPr lang="en-AU" dirty="0"/>
+                    </a:p>
+                  </a:txBody>
+                  <a:tcPr/>
+                </a:tc>
+                <a:tc>
+                  <a:txBody>
+                    <a:bodyPr/>
+                    <a:lstStyle/>
+                    <a:p>
+                      <a:r>
+                        <a:rPr lang="en-US" dirty="0" smtClean="0"/>
+                        <a:t>0.01</a:t>
+                      </a:r>
+                      <a:endParaRPr lang="en-AU" dirty="0"/>
+                    </a:p>
+                  </a:txBody>
+                  <a:tcPr/>
+                </a:tc>
+                <a:tc>
+                  <a:txBody>
+                    <a:bodyPr/>
+                    <a:lstStyle/>
+                    <a:p>
+                      <a:r>
+                        <a:rPr lang="en-US" dirty="0" smtClean="0"/>
+                        <a:t>0.39</a:t>
+                      </a:r>
+                      <a:endParaRPr lang="en-AU" dirty="0"/>
+                    </a:p>
+                  </a:txBody>
+                  <a:tcPr/>
+                </a:tc>
+                <a:tc>
+                  <a:txBody>
+                    <a:bodyPr/>
+                    <a:lstStyle/>
+                    <a:p>
+                      <a:r>
+                        <a:rPr lang="en-US" dirty="0" smtClean="0"/>
+                        <a:t>0.24</a:t>
+                      </a:r>
+                      <a:endParaRPr lang="en-AU" dirty="0"/>
+                    </a:p>
+                  </a:txBody>
+                  <a:tcPr/>
+                </a:tc>
+              </a:tr>
+              <a:tr h="370840">
+                <a:tc>
+                  <a:txBody>
+                    <a:bodyPr/>
+                    <a:lstStyle/>
+                    <a:p>
+                      <a:r>
+                        <a:rPr lang="en-US" dirty="0" smtClean="0"/>
+                        <a:t>A</a:t>
+                      </a:r>
+                      <a:endParaRPr lang="en-AU" dirty="0"/>
+                    </a:p>
+                  </a:txBody>
+                  <a:tcPr/>
+                </a:tc>
+                <a:tc>
+                  <a:txBody>
+                    <a:bodyPr/>
+                    <a:lstStyle/>
+                    <a:p>
+                      <a:r>
+                        <a:rPr lang="en-US" dirty="0" smtClean="0"/>
+                        <a:t>0.010</a:t>
+                      </a:r>
+                      <a:endParaRPr lang="en-AU" dirty="0"/>
+                    </a:p>
+                  </a:txBody>
+                  <a:tcPr/>
+                </a:tc>
+                <a:tc>
+                  <a:txBody>
+                    <a:bodyPr/>
+                    <a:lstStyle/>
+                    <a:p>
+                      <a:r>
+                        <a:rPr lang="en-US" dirty="0" smtClean="0"/>
+                        <a:t>0.01</a:t>
+                      </a:r>
+                      <a:endParaRPr lang="en-AU" dirty="0"/>
+                    </a:p>
+                  </a:txBody>
+                  <a:tcPr/>
+                </a:tc>
+                <a:tc>
+                  <a:txBody>
+                    <a:bodyPr/>
+                    <a:lstStyle/>
+                    <a:p>
+                      <a:r>
+                        <a:rPr lang="en-US" dirty="0" smtClean="0"/>
+                        <a:t>0.49</a:t>
+                      </a:r>
+                      <a:endParaRPr lang="en-AU" dirty="0"/>
+                    </a:p>
+                  </a:txBody>
+                  <a:tcPr>
+                    <a:solidFill>
+                      <a:schemeClr val="bg1">
+                        <a:lumMod val="65000"/>
+                        <a:lumOff val="35000"/>
+                      </a:schemeClr>
+                    </a:solidFill>
+                  </a:tcPr>
+                </a:tc>
+                <a:tc>
+                  <a:txBody>
+                    <a:bodyPr/>
+                    <a:lstStyle/>
+                    <a:p>
+                      <a:r>
+                        <a:rPr lang="en-US" dirty="0" smtClean="0"/>
+                        <a:t>0.01</a:t>
+                      </a:r>
+                      <a:endParaRPr lang="en-AU" dirty="0"/>
+                    </a:p>
+                  </a:txBody>
+                  <a:tcPr/>
+                </a:tc>
+              </a:tr>
+              <a:tr h="370840">
+                <a:tc>
+                  <a:txBody>
+                    <a:bodyPr/>
+                    <a:lstStyle/>
+                    <a:p>
+                      <a:r>
+                        <a:rPr lang="en-US" dirty="0" smtClean="0"/>
+                        <a:t>U</a:t>
+                      </a:r>
+                      <a:endParaRPr lang="en-AU" dirty="0"/>
+                    </a:p>
+                  </a:txBody>
+                  <a:tcPr/>
+                </a:tc>
+                <a:tc>
+                  <a:txBody>
+                    <a:bodyPr/>
+                    <a:lstStyle/>
+                    <a:p>
+                      <a:r>
+                        <a:rPr lang="en-US" dirty="0" smtClean="0"/>
+                        <a:t>0.395</a:t>
+                      </a:r>
+                      <a:endParaRPr lang="en-AU" dirty="0"/>
+                    </a:p>
+                  </a:txBody>
+                  <a:tcPr/>
+                </a:tc>
+                <a:tc>
+                  <a:txBody>
+                    <a:bodyPr/>
+                    <a:lstStyle/>
+                    <a:p>
+                      <a:r>
+                        <a:rPr lang="en-US" dirty="0" smtClean="0"/>
+                        <a:t>0.01</a:t>
+                      </a:r>
+                      <a:endParaRPr lang="en-AU" dirty="0"/>
+                    </a:p>
+                  </a:txBody>
+                  <a:tcPr/>
+                </a:tc>
+                <a:tc>
+                  <a:txBody>
+                    <a:bodyPr/>
+                    <a:lstStyle/>
+                    <a:p>
+                      <a:r>
+                        <a:rPr lang="en-US" dirty="0" smtClean="0"/>
+                        <a:t>0.01</a:t>
+                      </a:r>
+                      <a:endParaRPr lang="en-AU" dirty="0"/>
+                    </a:p>
+                  </a:txBody>
+                  <a:tcPr/>
+                </a:tc>
+                <a:tc>
+                  <a:txBody>
+                    <a:bodyPr/>
+                    <a:lstStyle/>
+                    <a:p>
+                      <a:r>
+                        <a:rPr lang="en-US" dirty="0" smtClean="0"/>
+                        <a:t>0.01</a:t>
+                      </a:r>
+                      <a:endParaRPr lang="en-AU" dirty="0"/>
+                    </a:p>
+                  </a:txBody>
+                  <a:tcPr/>
+                </a:tc>
+              </a:tr>
+            </a:tbl>
+          </a:graphicData>
+        </a:graphic>
+      </p:graphicFrame>
+      <p:pic>
+        <p:nvPicPr>
+          <p:cNvPr id="6" name="Picture 5"/>
+          <p:cNvPicPr>
+            <a:picLocks noChangeAspect="1"/>
+          </p:cNvPicPr>
+          <p:nvPr/>
+        </p:nvPicPr>
+        <p:blipFill>
+          <a:blip r:embed="rId2"/>
+          <a:stretch>
+            <a:fillRect/>
+          </a:stretch>
+        </p:blipFill>
+        <p:spPr>
+          <a:xfrm>
+            <a:off x="1772083" y="3909494"/>
+            <a:ext cx="2089631" cy="2054214"/>
+          </a:xfrm>
+          <a:prstGeom prst="rect">
+            <a:avLst/>
+          </a:prstGeom>
+        </p:spPr>
+      </p:pic>
+      <p:pic>
+        <p:nvPicPr>
+          <p:cNvPr id="9" name="Picture 8"/>
+          <p:cNvPicPr>
+            <a:picLocks noChangeAspect="1"/>
+          </p:cNvPicPr>
+          <p:nvPr/>
+        </p:nvPicPr>
+        <p:blipFill>
+          <a:blip r:embed="rId3"/>
+          <a:stretch>
+            <a:fillRect/>
+          </a:stretch>
+        </p:blipFill>
+        <p:spPr>
+          <a:xfrm>
+            <a:off x="4953001" y="2442040"/>
+            <a:ext cx="6228538" cy="3357076"/>
+          </a:xfrm>
+          <a:prstGeom prst="rect">
+            <a:avLst/>
+          </a:prstGeom>
+        </p:spPr>
+      </p:pic>
+    </p:spTree>
+    <p:extLst>
+      <p:ext uri="{BB962C8B-B14F-4D97-AF65-F5344CB8AC3E}">
+        <p14:creationId xmlns:p14="http://schemas.microsoft.com/office/powerpoint/2010/main" val="2541292409"/>
+      </p:ext>
+    </p:extLst>
+  </p:cSld>
+  <p:clrMapOvr>
+    <a:masterClrMapping/>
+  </p:clrMapOvr>
+  <p:timing>
+    <p:tnLst>
+      <p:par>
+        <p:cTn id="1" dur="indefinite" restart="never" nodeType="tmRoot"/>
+      </p:par>
+    </p:tnLst>
+  </p:timing>
 </p:sld>
 </file>
 
@@ -5913,7 +6804,7 @@
         <p:spPr>
           <a:xfrm>
             <a:off x="692876" y="1959562"/>
-            <a:ext cx="6597610" cy="3754874"/>
+            <a:ext cx="6597610" cy="4001095"/>
           </a:xfrm>
           <a:prstGeom prst="rect">
             <a:avLst/>
@@ -5955,15 +6846,15 @@
               <a:t>Binding to target mRNA decreases protein function by RISC inhibition and degradation </a:t>
             </a:r>
             <a:r>
-              <a:rPr lang="en-US" sz="2000" dirty="0" smtClean="0"/>
+              <a:rPr lang="en-US" dirty="0" smtClean="0"/>
               <a:t>(Gregory </a:t>
             </a:r>
             <a:r>
-              <a:rPr lang="en-US" sz="2000" i="1" dirty="0" smtClean="0"/>
+              <a:rPr lang="en-US" i="1" dirty="0" smtClean="0"/>
               <a:t>et al. </a:t>
             </a:r>
             <a:r>
-              <a:rPr lang="en-US" sz="2000" dirty="0" smtClean="0"/>
+              <a:rPr lang="en-US" dirty="0" smtClean="0"/>
               <a:t>2005)</a:t>
             </a:r>
           </a:p>
@@ -5985,9 +6876,21 @@
             </a:r>
             <a:r>
               <a:rPr lang="en-US" sz="2800" dirty="0" smtClean="0"/>
-              <a:t>, miRNAs) regulates pathways in the recipient cells</a:t>
-            </a:r>
-            <a:endParaRPr lang="en-AU" sz="2800" dirty="0"/>
+              <a:t>, miRNAs) regulates pathways in the recipient cells </a:t>
+            </a:r>
+            <a:r>
+              <a:rPr lang="en-US" dirty="0" smtClean="0"/>
+              <a:t>(</a:t>
+            </a:r>
+            <a:r>
+              <a:rPr lang="en-US" dirty="0" err="1" smtClean="0"/>
+              <a:t>Hannafon</a:t>
+            </a:r>
+            <a:r>
+              <a:rPr lang="en-US" dirty="0" smtClean="0"/>
+              <a:t> &amp; Ding 2013)</a:t>
+            </a:r>
+            <a:endParaRPr lang="en-AU" dirty="0"/>
           </a:p>
         </p:txBody>
       </p:sp>
@@ -6066,7 +6969,7 @@
         </p:nvSpPr>
         <p:spPr>
           <a:xfrm>
-            <a:off x="838200" y="207963"/>
+            <a:off x="838200" y="164420"/>
             <a:ext cx="10515600" cy="1325563"/>
           </a:xfrm>
         </p:spPr>
@@ -6103,8 +7006,8 @@
         </p:nvSpPr>
         <p:spPr>
           <a:xfrm>
-            <a:off x="5571432" y="1820094"/>
-            <a:ext cx="6038850" cy="4351338"/>
+            <a:off x="4949372" y="2099833"/>
+            <a:ext cx="6631882" cy="4351338"/>
           </a:xfrm>
         </p:spPr>
         <p:txBody>
@@ -6139,8 +7042,29 @@
           <a:p>
             <a:r>
               <a:rPr lang="en-US" dirty="0" smtClean="0"/>
-              <a:t>Increased stability of contents compared to unbound secretion into extracellular serum</a:t>
-            </a:r>
+              <a:t>Increased stability of contents compared to unbound secretion into extracellular serum </a:t>
+            </a:r>
+            <a:r>
+              <a:rPr lang="en-US" sz="1800" dirty="0" smtClean="0"/>
+              <a:t>(</a:t>
+            </a:r>
+            <a:r>
+              <a:rPr lang="en-US" sz="1800" dirty="0" err="1" smtClean="0"/>
+              <a:t>Mulcahy</a:t>
+            </a:r>
+            <a:r>
+              <a:rPr lang="en-US" sz="1800" dirty="0" smtClean="0"/>
+              <a:t> </a:t>
+            </a:r>
+            <a:r>
+              <a:rPr lang="en-US" sz="1800" i="1" dirty="0" smtClean="0"/>
+              <a:t>et al</a:t>
+            </a:r>
+            <a:r>
+              <a:rPr lang="en-US" sz="1800" dirty="0" smtClean="0"/>
+              <a:t> 2014)</a:t>
+            </a:r>
+            <a:endParaRPr lang="en-US" dirty="0" smtClean="0"/>
           </a:p>
           <a:p>
             <a:pPr>
@@ -6159,22 +7083,21 @@
       </p:sp>
       <p:pic>
         <p:nvPicPr>
-          <p:cNvPr id="4" name="Picture 3"/>
+          <p:cNvPr id="5" name="Picture 4"/>
           <p:cNvPicPr>
             <a:picLocks noChangeAspect="1"/>
           </p:cNvPicPr>
           <p:nvPr/>
         </p:nvPicPr>
-        <p:blipFill>
+        <p:blipFill rotWithShape="1">
           <a:blip r:embed="rId3"/>
-          <a:stretch>
-            <a:fillRect/>
-          </a:stretch>
+          <a:srcRect l="2540" b="3668"/>
+          <a:stretch/>
         </p:blipFill>
         <p:spPr>
           <a:xfrm>
-            <a:off x="838200" y="1640543"/>
-            <a:ext cx="4123266" cy="4710440"/>
+            <a:off x="653142" y="1540354"/>
+            <a:ext cx="4038337" cy="4910817"/>
           </a:xfrm>
           <a:prstGeom prst="rect">
             <a:avLst/>
@@ -6292,18 +7215,6 @@
                 <a:spcPct val="100000"/>
               </a:lnSpc>
             </a:pPr>
-            <a:r>
-              <a:rPr lang="en-US" dirty="0" smtClean="0"/>
-              <a:t>miRNAs exported can change disproportionally to the cellular content</a:t>
-            </a:r>
-          </a:p>
-          <a:p>
-            <a:pPr marL="0" indent="0">
-              <a:lnSpc>
-                <a:spcPct val="100000"/>
-              </a:lnSpc>
-              <a:buNone/>
-            </a:pPr>
             <a:endParaRPr lang="en-AU" dirty="0" smtClean="0"/>
           </a:p>
           <a:p>
@@ -6313,32 +7224,32 @@
               </a:lnSpc>
             </a:pPr>
             <a:r>
-              <a:rPr lang="en-AU" dirty="0" err="1" smtClean="0"/>
-              <a:t>Sumoylated</a:t>
-            </a:r>
-            <a:r>
-              <a:rPr lang="en-AU" dirty="0" smtClean="0"/>
-              <a:t> </a:t>
-            </a:r>
-            <a:r>
-              <a:rPr lang="en-AU" dirty="0" err="1" smtClean="0"/>
-              <a:t>hnRNP</a:t>
-            </a:r>
-            <a:r>
-              <a:rPr lang="en-AU" dirty="0" smtClean="0"/>
-              <a:t> A2B1 involved in miRNA export via </a:t>
-            </a:r>
-            <a:r>
-              <a:rPr lang="en-AU" dirty="0" err="1" smtClean="0"/>
-              <a:t>exosomes</a:t>
-            </a:r>
-            <a:r>
-              <a:rPr lang="en-AU" dirty="0"/>
-              <a:t>. </a:t>
-            </a:r>
-            <a:r>
-              <a:rPr lang="en-AU" sz="1700" dirty="0"/>
+              <a:rPr lang="en-US" dirty="0" smtClean="0"/>
+              <a:t>miRNAs exported can change disproportionally to the cellular content </a:t>
+            </a:r>
+            <a:r>
+              <a:rPr lang="en-US" sz="1700" dirty="0" smtClean="0"/>
               <a:t>(</a:t>
+            </a:r>
+            <a:r>
+              <a:rPr lang="en-US" sz="1700" dirty="0" err="1"/>
+              <a:t>Collino</a:t>
+            </a:r>
+            <a:r>
+              <a:rPr lang="en-US" sz="1700" dirty="0"/>
+              <a:t> et al. 2010; </a:t>
+            </a:r>
+            <a:r>
+              <a:rPr lang="en-US" sz="1700" dirty="0" err="1"/>
+              <a:t>Inder</a:t>
+            </a:r>
+            <a:r>
+              <a:rPr lang="en-US" sz="1700" dirty="0"/>
+              <a:t> et al. </a:t>
+            </a:r>
+            <a:r>
+              <a:rPr lang="en-US" sz="1700" dirty="0" smtClean="0"/>
+              <a:t>2014; </a:t>
             </a:r>
             <a:r>
               <a:rPr lang="en-AU" sz="1700" dirty="0" err="1"/>
@@ -6354,9 +7265,25 @@
             </a:r>
             <a:r>
               <a:rPr lang="en-AU" sz="1700" dirty="0"/>
-              <a:t> 2013) </a:t>
-            </a:r>
-            <a:endParaRPr lang="en-US" dirty="0"/>
+              <a:t> </a:t>
+            </a:r>
+            <a:r>
+              <a:rPr lang="en-AU" sz="1700" dirty="0" smtClean="0"/>
+              <a:t>2013</a:t>
+            </a:r>
+            <a:r>
+              <a:rPr lang="en-US" sz="1700" dirty="0" smtClean="0"/>
+              <a:t>)</a:t>
+            </a:r>
+          </a:p>
+          <a:p>
+            <a:pPr marL="0" indent="0">
+              <a:lnSpc>
+                <a:spcPct val="100000"/>
+              </a:lnSpc>
+              <a:buNone/>
+            </a:pPr>
+            <a:endParaRPr lang="en-AU" dirty="0" smtClean="0"/>
           </a:p>
           <a:p>
             <a:pPr>
@@ -6366,7 +7293,7 @@
             </a:pPr>
             <a:r>
               <a:rPr lang="en-US" dirty="0" smtClean="0"/>
-              <a:t>Regulation of export still unknown</a:t>
+              <a:t>Mechanism of export still unknown</a:t>
             </a:r>
           </a:p>
           <a:p>
@@ -6383,9 +7310,55 @@
           </a:p>
         </p:txBody>
       </p:sp>
+      <p:sp>
+        <p:nvSpPr>
+          <p:cNvPr id="4" name="TextBox 3"/>
+          <p:cNvSpPr txBox="1"/>
+          <p:nvPr/>
+        </p:nvSpPr>
+        <p:spPr>
+          <a:xfrm>
+            <a:off x="8922967" y="5391249"/>
+            <a:ext cx="3023957" cy="369332"/>
+          </a:xfrm>
+          <a:prstGeom prst="rect">
+            <a:avLst/>
+          </a:prstGeom>
+          <a:noFill/>
+        </p:spPr>
+        <p:txBody>
+          <a:bodyPr wrap="square" rtlCol="0">
+            <a:spAutoFit/>
+          </a:bodyPr>
+          <a:lstStyle/>
+          <a:p>
+            <a:r>
+              <a:rPr lang="en-AU" dirty="0" smtClean="0"/>
+              <a:t>(</a:t>
+            </a:r>
+            <a:r>
+              <a:rPr lang="en-AU" dirty="0" err="1" smtClean="0"/>
+              <a:t>Villarroya-Beltri</a:t>
+            </a:r>
+            <a:r>
+              <a:rPr lang="en-AU" dirty="0" smtClean="0"/>
+              <a:t> </a:t>
+            </a:r>
+            <a:r>
+              <a:rPr lang="en-AU" i="1" dirty="0" smtClean="0"/>
+              <a:t>et al</a:t>
+            </a:r>
+            <a:r>
+              <a:rPr lang="en-AU" dirty="0" smtClean="0"/>
+              <a:t> 2013) </a:t>
+            </a:r>
+            <a:endParaRPr lang="en-AU" dirty="0"/>
+          </a:p>
+        </p:txBody>
+      </p:sp>
       <p:pic>
         <p:nvPicPr>
-          <p:cNvPr id="5" name="Picture 4"/>
+          <p:cNvPr id="6" name="Picture 5"/>
           <p:cNvPicPr>
             <a:picLocks noChangeAspect="1"/>
           </p:cNvPicPr>
@@ -6399,60 +7372,14 @@
         </p:blipFill>
         <p:spPr>
           <a:xfrm>
-            <a:off x="7514298" y="1973180"/>
-            <a:ext cx="4122714" cy="3333455"/>
+            <a:off x="7808785" y="2048136"/>
+            <a:ext cx="3743325" cy="3324225"/>
           </a:xfrm>
           <a:prstGeom prst="rect">
             <a:avLst/>
           </a:prstGeom>
         </p:spPr>
       </p:pic>
-      <p:sp>
-        <p:nvSpPr>
-          <p:cNvPr id="4" name="TextBox 3"/>
-          <p:cNvSpPr txBox="1"/>
-          <p:nvPr/>
-        </p:nvSpPr>
-        <p:spPr>
-          <a:xfrm>
-            <a:off x="8922967" y="5391249"/>
-            <a:ext cx="3023957" cy="369332"/>
-          </a:xfrm>
-          <a:prstGeom prst="rect">
-            <a:avLst/>
-          </a:prstGeom>
-          <a:noFill/>
-        </p:spPr>
-        <p:txBody>
-          <a:bodyPr wrap="square" rtlCol="0">
-            <a:spAutoFit/>
-          </a:bodyPr>
-          <a:lstStyle/>
-          <a:p>
-            <a:r>
-              <a:rPr lang="en-AU" dirty="0" smtClean="0"/>
-              <a:t>(</a:t>
-            </a:r>
-            <a:r>
-              <a:rPr lang="en-AU" dirty="0" err="1" smtClean="0"/>
-              <a:t>Villarroya-Beltri</a:t>
-            </a:r>
-            <a:r>
-              <a:rPr lang="en-AU" dirty="0" smtClean="0"/>
-              <a:t> </a:t>
-            </a:r>
-            <a:r>
-              <a:rPr lang="en-AU" i="1" dirty="0" smtClean="0"/>
-              <a:t>et al</a:t>
-            </a:r>
-            <a:r>
-              <a:rPr lang="en-AU" dirty="0" smtClean="0"/>
-              <a:t> 2013) </a:t>
-            </a:r>
-            <a:endParaRPr lang="en-AU" dirty="0"/>
-          </a:p>
-        </p:txBody>
-      </p:sp>
     </p:spTree>
     <p:extLst>
       <p:ext uri="{BB962C8B-B14F-4D97-AF65-F5344CB8AC3E}">
@@ -6516,7 +7443,23 @@
                   <a:schemeClr val="bg1"/>
                 </a:solidFill>
               </a:rPr>
-              <a:t>Lipid Rafts Affecting Cargo Sorting</a:t>
+              <a:t>Lipid Rafts </a:t>
+            </a:r>
+            <a:r>
+              <a:rPr lang="en-US" b="1" dirty="0">
+                <a:solidFill>
+                  <a:schemeClr val="bg1"/>
+                </a:solidFill>
+              </a:rPr>
+              <a:t>E</a:t>
+            </a:r>
+            <a:r>
+              <a:rPr lang="en-US" b="1" dirty="0" smtClean="0">
+                <a:solidFill>
+                  <a:schemeClr val="bg1"/>
+                </a:solidFill>
+              </a:rPr>
+              <a:t>ffecting Cargo Sorting</a:t>
             </a:r>
             <a:endParaRPr lang="en-AU" b="1" dirty="0">
               <a:solidFill>
@@ -6538,7 +7481,7 @@
         </p:nvSpPr>
         <p:spPr>
           <a:xfrm>
-            <a:off x="838200" y="1825625"/>
+            <a:off x="838200" y="2026793"/>
             <a:ext cx="10515600" cy="4351338"/>
           </a:xfrm>
         </p:spPr>
@@ -6549,20 +7492,6 @@
             <a:r>
               <a:rPr lang="en-US" dirty="0" smtClean="0"/>
               <a:t>Sorting may be impacted by lipid raft composition. </a:t>
-            </a:r>
-          </a:p>
-          <a:p>
-            <a:r>
-              <a:rPr lang="en-US" dirty="0" smtClean="0"/>
-              <a:t>Both types of EVs contain cholesterol, sphingolipid and ceramide enriched </a:t>
-            </a:r>
-            <a:r>
-              <a:rPr lang="en-US" dirty="0" err="1" smtClean="0"/>
-              <a:t>microdomains</a:t>
-            </a:r>
-            <a:r>
-              <a:rPr lang="en-US" dirty="0" smtClean="0"/>
-              <a:t>. </a:t>
             </a:r>
           </a:p>
           <a:p>
@@ -6588,8 +7517,8 @@
         </p:blipFill>
         <p:spPr>
           <a:xfrm>
-            <a:off x="838199" y="3377089"/>
-            <a:ext cx="4055127" cy="2799874"/>
+            <a:off x="691896" y="3000119"/>
+            <a:ext cx="4309746" cy="2975676"/>
           </a:xfrm>
           <a:prstGeom prst="rect">
             <a:avLst/>
@@ -6604,8 +7533,8 @@
         </p:nvSpPr>
         <p:spPr>
           <a:xfrm>
-            <a:off x="5129658" y="3792141"/>
-            <a:ext cx="6570134" cy="1969770"/>
+            <a:off x="5147946" y="3055840"/>
+            <a:ext cx="6570134" cy="3524042"/>
           </a:xfrm>
           <a:prstGeom prst="rect">
             <a:avLst/>
@@ -6617,6 +7546,55 @@
             <a:spAutoFit/>
           </a:bodyPr>
           <a:lstStyle/>
+          <a:p>
+            <a:pPr marL="342900" indent="-342900">
+              <a:buFont typeface="Arial" panose="020B0604020202020204" pitchFamily="34" charset="0"/>
+              <a:buChar char="•"/>
+            </a:pPr>
+            <a:r>
+              <a:rPr lang="en-US" sz="2800" dirty="0" smtClean="0"/>
+              <a:t>EVs </a:t>
+            </a:r>
+            <a:r>
+              <a:rPr lang="en-US" sz="2800" dirty="0"/>
+              <a:t>contain cholesterol, sphingolipid and ceramide enriched </a:t>
+            </a:r>
+            <a:r>
+              <a:rPr lang="en-US" sz="2800" dirty="0" err="1"/>
+              <a:t>microdomains</a:t>
+            </a:r>
+            <a:r>
+              <a:rPr lang="en-US" sz="2800" dirty="0"/>
+              <a:t>. </a:t>
+            </a:r>
+            <a:r>
+              <a:rPr lang="en-US" sz="1700" dirty="0"/>
+              <a:t>(</a:t>
+            </a:r>
+            <a:r>
+              <a:rPr lang="en-AU" sz="1700" dirty="0" err="1"/>
+              <a:t>Cocucci</a:t>
+            </a:r>
+            <a:r>
+              <a:rPr lang="en-AU" sz="1700" i="1" dirty="0"/>
+              <a:t> et al.</a:t>
+            </a:r>
+            <a:r>
+              <a:rPr lang="en-AU" sz="1700" dirty="0"/>
+              <a:t> 2015</a:t>
+            </a:r>
+            <a:r>
+              <a:rPr lang="en-US" sz="1700" dirty="0"/>
+              <a:t>)</a:t>
+            </a:r>
+          </a:p>
+          <a:p>
+            <a:pPr marL="342900" indent="-342900">
+              <a:buFont typeface="Arial" panose="020B0604020202020204" pitchFamily="34" charset="0"/>
+              <a:buChar char="•"/>
+            </a:pPr>
+            <a:endParaRPr lang="en-US" sz="2800" dirty="0" smtClean="0"/>
+          </a:p>
           <a:p>
             <a:pPr marL="342900" indent="-342900">
               <a:buFont typeface="Arial" panose="020B0604020202020204" pitchFamily="34" charset="0"/>
@@ -6706,6 +7684,13 @@
   <p:clrMapOvr>
     <a:masterClrMapping/>
   </p:clrMapOvr>
+  <p:timing>
+    <p:tnLst>
+      <p:par>
+        <p:cTn id="1" dur="indefinite" restart="never" nodeType="tmRoot"/>
+      </p:par>
+    </p:tnLst>
+  </p:timing>
 </p:sld>
 </file>
 
@@ -6726,6 +7711,93 @@
           <a:chExt cx="0" cy="0"/>
         </a:xfrm>
       </p:grpSpPr>
+      <p:pic>
+        <p:nvPicPr>
+          <p:cNvPr id="13" name="Picture 12"/>
+          <p:cNvPicPr>
+            <a:picLocks noChangeAspect="1"/>
+          </p:cNvPicPr>
+          <p:nvPr/>
+        </p:nvPicPr>
+        <p:blipFill>
+          <a:blip r:embed="rId3">
+            <a:lum bright="70000" contrast="-70000"/>
+          </a:blip>
+          <a:stretch>
+            <a:fillRect/>
+          </a:stretch>
+        </p:blipFill>
+        <p:spPr>
+          <a:xfrm>
+            <a:off x="8166210" y="3105198"/>
+            <a:ext cx="3432345" cy="3036071"/>
+          </a:xfrm>
+          <a:prstGeom prst="rect">
+            <a:avLst/>
+          </a:prstGeom>
+        </p:spPr>
+      </p:pic>
+      <p:pic>
+        <p:nvPicPr>
+          <p:cNvPr id="12" name="Picture 11"/>
+          <p:cNvPicPr>
+            <a:picLocks noChangeAspect="1"/>
+          </p:cNvPicPr>
+          <p:nvPr/>
+        </p:nvPicPr>
+        <p:blipFill>
+          <a:blip r:embed="rId4">
+            <a:lum bright="70000" contrast="-70000"/>
+          </a:blip>
+          <a:stretch>
+            <a:fillRect/>
+          </a:stretch>
+        </p:blipFill>
+        <p:spPr>
+          <a:xfrm>
+            <a:off x="4139010" y="3718152"/>
+            <a:ext cx="3828620" cy="2121592"/>
+          </a:xfrm>
+          <a:prstGeom prst="rect">
+            <a:avLst/>
+          </a:prstGeom>
+        </p:spPr>
+      </p:pic>
+      <p:pic>
+        <p:nvPicPr>
+          <p:cNvPr id="11" name="Picture 10"/>
+          <p:cNvPicPr>
+            <a:picLocks noChangeAspect="1"/>
+          </p:cNvPicPr>
+          <p:nvPr/>
+        </p:nvPicPr>
+        <p:blipFill>
+          <a:blip r:embed="rId5">
+            <a:lum bright="70000" contrast="-70000"/>
+          </a:blip>
+          <a:stretch>
+            <a:fillRect/>
+          </a:stretch>
+        </p:blipFill>
+        <p:spPr>
+          <a:xfrm>
+            <a:off x="354685" y="3557549"/>
+            <a:ext cx="3548180" cy="2438611"/>
+          </a:xfrm>
+          <a:prstGeom prst="rect">
+            <a:avLst/>
+          </a:prstGeom>
+          <a:blipFill dpi="0" rotWithShape="1">
+            <a:blip r:embed="rId6">
+              <a:alphaModFix amt="13000"/>
+            </a:blip>
+            <a:srcRect/>
+            <a:stretch>
+              <a:fillRect/>
+            </a:stretch>
+          </a:blipFill>
+        </p:spPr>
+      </p:pic>
       <p:sp>
         <p:nvSpPr>
           <p:cNvPr id="2" name="Title 1"/>
@@ -6736,13 +7808,18 @@
             <p:ph type="title"/>
           </p:nvPr>
         </p:nvSpPr>
-        <p:spPr/>
+        <p:spPr>
+          <a:xfrm>
+            <a:off x="838200" y="315541"/>
+            <a:ext cx="10515600" cy="1325563"/>
+          </a:xfrm>
+        </p:spPr>
         <p:txBody>
           <a:bodyPr/>
           <a:lstStyle/>
           <a:p>
             <a:r>
-              <a:rPr lang="en-US" b="1" dirty="0" smtClean="0">
+              <a:rPr lang="en-US" b="1" dirty="0">
                 <a:solidFill>
                   <a:schemeClr val="bg1"/>
                 </a:solidFill>
@@ -6769,8 +7846,8 @@
         </p:nvSpPr>
         <p:spPr>
           <a:xfrm>
-            <a:off x="838200" y="1900155"/>
-            <a:ext cx="6643977" cy="4619625"/>
+            <a:off x="838200" y="1726605"/>
+            <a:ext cx="10515600" cy="4582275"/>
           </a:xfrm>
         </p:spPr>
         <p:txBody>
@@ -6780,67 +7857,171 @@
           <a:lstStyle/>
           <a:p>
             <a:r>
-              <a:rPr lang="en-AU" dirty="0" smtClean="0"/>
-              <a:t>Increased Caveolin-1 expression without </a:t>
-            </a:r>
-            <a:r>
-              <a:rPr lang="en-AU" dirty="0" smtClean="0"/>
-              <a:t>Cavins in PC3.</a:t>
-            </a:r>
-            <a:endParaRPr lang="en-AU" dirty="0" smtClean="0"/>
-          </a:p>
-          <a:p>
-            <a:endParaRPr lang="en-AU" dirty="0"/>
-          </a:p>
-          <a:p>
-            <a:r>
-              <a:rPr lang="en-AU" dirty="0" smtClean="0"/>
-              <a:t>Caveolin-1 </a:t>
-            </a:r>
-            <a:r>
-              <a:rPr lang="en-AU" dirty="0"/>
-              <a:t>is a cholesterol transporter</a:t>
-            </a:r>
+              <a:rPr lang="en-AU" sz="2400" dirty="0"/>
+              <a:t>PC3 cells: </a:t>
+            </a:r>
+            <a:r>
+              <a:rPr lang="en-AU" sz="2400" dirty="0" smtClean="0"/>
+              <a:t>Aggressive prostate cancer cell line</a:t>
+            </a:r>
+            <a:endParaRPr lang="en-AU" sz="2400" dirty="0"/>
+          </a:p>
+          <a:p>
+            <a:r>
+              <a:rPr lang="en-AU" sz="2400" dirty="0" smtClean="0"/>
+              <a:t>Introduction </a:t>
+            </a:r>
+            <a:r>
+              <a:rPr lang="en-AU" sz="2400" dirty="0"/>
+              <a:t>of Cavin-1 results in </a:t>
+            </a:r>
+            <a:r>
+              <a:rPr lang="en-AU" sz="2400" dirty="0" smtClean="0"/>
+              <a:t>reduced oncogenic behaviour, modulated cholesterol </a:t>
+            </a:r>
+            <a:r>
+              <a:rPr lang="en-AU" sz="2400" dirty="0"/>
+              <a:t>re-distribution, </a:t>
+            </a:r>
+            <a:r>
+              <a:rPr lang="en-AU" sz="2400" dirty="0" smtClean="0"/>
+              <a:t>protein </a:t>
+            </a:r>
+            <a:r>
+              <a:rPr lang="en-AU" sz="2400" dirty="0"/>
+              <a:t>content and </a:t>
+            </a:r>
+            <a:r>
+              <a:rPr lang="en-AU" sz="2400" dirty="0" smtClean="0"/>
+              <a:t>EV </a:t>
+            </a:r>
+            <a:r>
+              <a:rPr lang="en-AU" sz="2400" dirty="0" err="1" smtClean="0"/>
+              <a:t>miRNA</a:t>
+            </a:r>
+            <a:r>
+              <a:rPr lang="en-AU" sz="2400" dirty="0" smtClean="0"/>
+              <a:t> content</a:t>
+            </a:r>
+            <a:r>
+              <a:rPr lang="en-AU" sz="2400" dirty="0"/>
+              <a:t>. </a:t>
+            </a:r>
+            <a:endParaRPr lang="en-AU" sz="2400" dirty="0" smtClean="0"/>
           </a:p>
           <a:p>
             <a:pPr marL="0" indent="0">
               <a:buNone/>
             </a:pPr>
-            <a:endParaRPr lang="en-AU" dirty="0" smtClean="0"/>
-          </a:p>
-          <a:p>
-            <a:r>
-              <a:rPr lang="en-AU" dirty="0" smtClean="0"/>
-              <a:t>When </a:t>
-            </a:r>
-            <a:r>
-              <a:rPr lang="en-AU" dirty="0"/>
-              <a:t>accompanied by </a:t>
-            </a:r>
-            <a:r>
-              <a:rPr lang="en-AU" dirty="0" smtClean="0"/>
-              <a:t>Cavin-1 </a:t>
-            </a:r>
-            <a:r>
-              <a:rPr lang="en-AU" dirty="0"/>
-              <a:t>it will form caveolae, utilised in Endocytosis. </a:t>
-            </a:r>
-            <a:endParaRPr lang="en-AU" dirty="0" smtClean="0"/>
+            <a:endParaRPr lang="en-US" sz="2400" dirty="0" smtClean="0"/>
           </a:p>
           <a:p>
             <a:pPr marL="0" indent="0">
               <a:buNone/>
             </a:pPr>
-            <a:endParaRPr lang="en-AU" dirty="0" smtClean="0"/>
-          </a:p>
-          <a:p>
-            <a:r>
-              <a:rPr lang="en-AU" dirty="0" smtClean="0"/>
-              <a:t>Enrichment of Caveolin-1 on EVs</a:t>
-            </a:r>
-          </a:p>
-          <a:p>
-            <a:endParaRPr lang="en-AU" sz="2400" dirty="0" smtClean="0"/>
+            <a:endParaRPr lang="en-US" sz="2200" dirty="0" smtClean="0"/>
+          </a:p>
+          <a:p>
+            <a:pPr marL="0" indent="0">
+              <a:buNone/>
+            </a:pPr>
+            <a:endParaRPr lang="en-US" sz="2200" dirty="0" smtClean="0"/>
+          </a:p>
+          <a:p>
+            <a:pPr marL="0" indent="0">
+              <a:buNone/>
+            </a:pPr>
+            <a:endParaRPr lang="en-US" sz="2200" dirty="0" smtClean="0"/>
+          </a:p>
+          <a:p>
+            <a:pPr marL="0" indent="0">
+              <a:buNone/>
+            </a:pPr>
+            <a:endParaRPr lang="en-US" sz="2200" dirty="0" smtClean="0"/>
+          </a:p>
+          <a:p>
+            <a:pPr marL="0" indent="0">
+              <a:buNone/>
+            </a:pPr>
+            <a:endParaRPr lang="en-US" sz="2200" dirty="0"/>
+          </a:p>
+          <a:p>
+            <a:pPr>
+              <a:lnSpc>
+                <a:spcPct val="150000"/>
+              </a:lnSpc>
+            </a:pPr>
+            <a:endParaRPr lang="en-US" sz="2200" dirty="0" smtClean="0"/>
+          </a:p>
+          <a:p>
+            <a:pPr>
+              <a:lnSpc>
+                <a:spcPct val="150000"/>
+              </a:lnSpc>
+            </a:pPr>
+            <a:endParaRPr lang="en-US" dirty="0" smtClean="0"/>
+          </a:p>
+        </p:txBody>
+      </p:sp>
+      <p:sp>
+        <p:nvSpPr>
+          <p:cNvPr id="5" name="TextBox 4"/>
+          <p:cNvSpPr txBox="1"/>
+          <p:nvPr/>
+        </p:nvSpPr>
+        <p:spPr>
+          <a:xfrm>
+            <a:off x="8513290" y="6423424"/>
+            <a:ext cx="3084394" cy="338554"/>
+          </a:xfrm>
+          <a:prstGeom prst="rect">
+            <a:avLst/>
+          </a:prstGeom>
+          <a:noFill/>
+        </p:spPr>
+        <p:txBody>
+          <a:bodyPr wrap="square" rtlCol="0">
+            <a:spAutoFit/>
+          </a:bodyPr>
+          <a:lstStyle/>
+          <a:p>
+            <a:r>
+              <a:rPr lang="en-AU" sz="1600" dirty="0" smtClean="0"/>
+              <a:t>(</a:t>
+            </a:r>
+            <a:r>
+              <a:rPr lang="en-AU" sz="1600" dirty="0" err="1" smtClean="0"/>
+              <a:t>Inder</a:t>
+            </a:r>
+            <a:r>
+              <a:rPr lang="en-AU" sz="1600" dirty="0" smtClean="0"/>
+              <a:t> </a:t>
+            </a:r>
+            <a:r>
+              <a:rPr lang="en-AU" sz="1600" i="1" dirty="0" smtClean="0"/>
+              <a:t>et al </a:t>
+            </a:r>
+            <a:r>
+              <a:rPr lang="en-AU" sz="1600" dirty="0" smtClean="0"/>
+              <a:t>2012; </a:t>
+            </a:r>
+            <a:r>
+              <a:rPr lang="en-AU" sz="1600" dirty="0" err="1" smtClean="0"/>
+              <a:t>Inder</a:t>
+            </a:r>
+            <a:r>
+              <a:rPr lang="en-AU" sz="1600" dirty="0" smtClean="0"/>
+              <a:t> </a:t>
+            </a:r>
+            <a:r>
+              <a:rPr lang="en-AU" sz="1600" i="1" dirty="0" smtClean="0"/>
+              <a:t>et al </a:t>
+            </a:r>
+            <a:r>
+              <a:rPr lang="en-AU" sz="1600" dirty="0" smtClean="0"/>
+              <a:t>2014)</a:t>
+            </a:r>
+            <a:endParaRPr lang="en-AU" sz="1600" dirty="0"/>
           </a:p>
         </p:txBody>
       </p:sp>
@@ -6853,15 +8034,81 @@
           <p:nvPr/>
         </p:nvPicPr>
         <p:blipFill>
-          <a:blip r:embed="rId3"/>
+          <a:blip r:embed="rId6">
+            <a:extLst>
+              <a:ext uri="{28A0092B-C50C-407E-A947-70E740481C1C}">
+                <a14:useLocalDpi xmlns:a14="http://schemas.microsoft.com/office/drawing/2010/main" val="0"/>
+              </a:ext>
+            </a:extLst>
+          </a:blip>
           <a:stretch>
             <a:fillRect/>
           </a:stretch>
         </p:blipFill>
         <p:spPr>
           <a:xfrm>
-            <a:off x="7633874" y="1670057"/>
-            <a:ext cx="3719926" cy="4589520"/>
+            <a:off x="344565" y="3557549"/>
+            <a:ext cx="3549690" cy="2434438"/>
+          </a:xfrm>
+          <a:prstGeom prst="rect">
+            <a:avLst/>
+          </a:prstGeom>
+        </p:spPr>
+      </p:pic>
+      <p:pic>
+        <p:nvPicPr>
+          <p:cNvPr id="6" name="Picture 5"/>
+          <p:cNvPicPr>
+            <a:picLocks noChangeAspect="1"/>
+          </p:cNvPicPr>
+          <p:nvPr/>
+        </p:nvPicPr>
+        <p:blipFill>
+          <a:blip r:embed="rId7">
+            <a:extLst>
+              <a:ext uri="{28A0092B-C50C-407E-A947-70E740481C1C}">
+                <a14:useLocalDpi xmlns:a14="http://schemas.microsoft.com/office/drawing/2010/main" val="0"/>
+              </a:ext>
+            </a:extLst>
+          </a:blip>
+          <a:stretch>
+            <a:fillRect/>
+          </a:stretch>
+        </p:blipFill>
+        <p:spPr>
+          <a:xfrm>
+            <a:off x="8174820" y="3103757"/>
+            <a:ext cx="3430602" cy="3037512"/>
+          </a:xfrm>
+          <a:prstGeom prst="rect">
+            <a:avLst/>
+          </a:prstGeom>
+        </p:spPr>
+      </p:pic>
+      <p:pic>
+        <p:nvPicPr>
+          <p:cNvPr id="9" name="Picture 8"/>
+          <p:cNvPicPr>
+            <a:picLocks noChangeAspect="1"/>
+          </p:cNvPicPr>
+          <p:nvPr/>
+        </p:nvPicPr>
+        <p:blipFill>
+          <a:blip r:embed="rId8">
+            <a:extLst>
+              <a:ext uri="{28A0092B-C50C-407E-A947-70E740481C1C}">
+                <a14:useLocalDpi xmlns:a14="http://schemas.microsoft.com/office/drawing/2010/main" val="0"/>
+              </a:ext>
+            </a:extLst>
+          </a:blip>
+          <a:stretch>
+            <a:fillRect/>
+          </a:stretch>
+        </p:blipFill>
+        <p:spPr>
+          <a:xfrm>
+            <a:off x="4140764" y="3718152"/>
+            <a:ext cx="3825113" cy="2121579"/>
           </a:xfrm>
           <a:prstGeom prst="rect">
             <a:avLst/>
@@ -6871,7 +8118,7 @@
     </p:spTree>
     <p:extLst>
       <p:ext uri="{BB962C8B-B14F-4D97-AF65-F5344CB8AC3E}">
-        <p14:creationId xmlns:p14="http://schemas.microsoft.com/office/powerpoint/2010/main" val="254767137"/>
+        <p14:creationId xmlns:p14="http://schemas.microsoft.com/office/powerpoint/2010/main" val="122657898"/>
       </p:ext>
     </p:extLst>
   </p:cSld>
@@ -6881,7 +8128,189 @@
   <p:timing>
     <p:tnLst>
       <p:par>
-        <p:cTn id="1" dur="indefinite" restart="never" nodeType="tmRoot"/>
+        <p:cTn id="1" dur="indefinite" restart="never" nodeType="tmRoot">
+          <p:childTnLst>
+            <p:seq concurrent="1" nextAc="seek">
+              <p:cTn id="2" dur="indefinite" nodeType="mainSeq">
+                <p:childTnLst>
+                  <p:par>
+                    <p:cTn id="3" fill="hold">
+                      <p:stCondLst>
+                        <p:cond delay="indefinite"/>
+                      </p:stCondLst>
+                      <p:childTnLst>
+                        <p:par>
+                          <p:cTn id="4" fill="hold">
+                            <p:stCondLst>
+                              <p:cond delay="0"/>
+                            </p:stCondLst>
+                            <p:childTnLst>
+                              <p:par>
+                                <p:cTn id="5" presetID="10" presetClass="entr" presetSubtype="0" fill="hold" nodeType="clickEffect">
+                                  <p:stCondLst>
+                                    <p:cond delay="0"/>
+                                  </p:stCondLst>
+                                  <p:childTnLst>
+                                    <p:set>
+                                      <p:cBhvr>
+                                        <p:cTn id="6" dur="1" fill="hold">
+                                          <p:stCondLst>
+                                            <p:cond delay="0"/>
+                                          </p:stCondLst>
+                                        </p:cTn>
+                                        <p:tgtEl>
+                                          <p:spTgt spid="4"/>
+                                        </p:tgtEl>
+                                        <p:attrNameLst>
+                                          <p:attrName>style.visibility</p:attrName>
+                                        </p:attrNameLst>
+                                      </p:cBhvr>
+                                      <p:to>
+                                        <p:strVal val="visible"/>
+                                      </p:to>
+                                    </p:set>
+                                    <p:animEffect transition="in" filter="fade">
+                                      <p:cBhvr>
+                                        <p:cTn id="7" dur="500"/>
+                                        <p:tgtEl>
+                                          <p:spTgt spid="4"/>
+                                        </p:tgtEl>
+                                      </p:cBhvr>
+                                    </p:animEffect>
+                                  </p:childTnLst>
+                                </p:cTn>
+                              </p:par>
+                            </p:childTnLst>
+                          </p:cTn>
+                        </p:par>
+                      </p:childTnLst>
+                    </p:cTn>
+                  </p:par>
+                  <p:par>
+                    <p:cTn id="8" fill="hold">
+                      <p:stCondLst>
+                        <p:cond delay="indefinite"/>
+                      </p:stCondLst>
+                      <p:childTnLst>
+                        <p:par>
+                          <p:cTn id="9" fill="hold">
+                            <p:stCondLst>
+                              <p:cond delay="0"/>
+                            </p:stCondLst>
+                            <p:childTnLst>
+                              <p:par>
+                                <p:cTn id="10" presetID="10" presetClass="entr" presetSubtype="0" fill="hold" nodeType="clickEffect">
+                                  <p:stCondLst>
+                                    <p:cond delay="0"/>
+                                  </p:stCondLst>
+                                  <p:childTnLst>
+                                    <p:set>
+                                      <p:cBhvr>
+                                        <p:cTn id="11" dur="1" fill="hold">
+                                          <p:stCondLst>
+                                            <p:cond delay="0"/>
+                                          </p:stCondLst>
+                                        </p:cTn>
+                                        <p:tgtEl>
+                                          <p:spTgt spid="9"/>
+                                        </p:tgtEl>
+                                        <p:attrNameLst>
+                                          <p:attrName>style.visibility</p:attrName>
+                                        </p:attrNameLst>
+                                      </p:cBhvr>
+                                      <p:to>
+                                        <p:strVal val="visible"/>
+                                      </p:to>
+                                    </p:set>
+                                    <p:animEffect transition="in" filter="fade">
+                                      <p:cBhvr>
+                                        <p:cTn id="12" dur="500"/>
+                                        <p:tgtEl>
+                                          <p:spTgt spid="9"/>
+                                        </p:tgtEl>
+                                      </p:cBhvr>
+                                    </p:animEffect>
+                                  </p:childTnLst>
+                                </p:cTn>
+                              </p:par>
+                            </p:childTnLst>
+                          </p:cTn>
+                        </p:par>
+                      </p:childTnLst>
+                    </p:cTn>
+                  </p:par>
+                  <p:par>
+                    <p:cTn id="13" fill="hold">
+                      <p:stCondLst>
+                        <p:cond delay="indefinite"/>
+                      </p:stCondLst>
+                      <p:childTnLst>
+                        <p:par>
+                          <p:cTn id="14" fill="hold">
+                            <p:stCondLst>
+                              <p:cond delay="0"/>
+                            </p:stCondLst>
+                            <p:childTnLst>
+                              <p:par>
+                                <p:cTn id="15" presetID="10" presetClass="entr" presetSubtype="0" fill="hold" nodeType="clickEffect">
+                                  <p:stCondLst>
+                                    <p:cond delay="0"/>
+                                  </p:stCondLst>
+                                  <p:childTnLst>
+                                    <p:set>
+                                      <p:cBhvr>
+                                        <p:cTn id="16" dur="1" fill="hold">
+                                          <p:stCondLst>
+                                            <p:cond delay="0"/>
+                                          </p:stCondLst>
+                                        </p:cTn>
+                                        <p:tgtEl>
+                                          <p:spTgt spid="6"/>
+                                        </p:tgtEl>
+                                        <p:attrNameLst>
+                                          <p:attrName>style.visibility</p:attrName>
+                                        </p:attrNameLst>
+                                      </p:cBhvr>
+                                      <p:to>
+                                        <p:strVal val="visible"/>
+                                      </p:to>
+                                    </p:set>
+                                    <p:animEffect transition="in" filter="fade">
+                                      <p:cBhvr>
+                                        <p:cTn id="17" dur="500"/>
+                                        <p:tgtEl>
+                                          <p:spTgt spid="6"/>
+                                        </p:tgtEl>
+                                      </p:cBhvr>
+                                    </p:animEffect>
+                                  </p:childTnLst>
+                                </p:cTn>
+                              </p:par>
+                            </p:childTnLst>
+                          </p:cTn>
+                        </p:par>
+                      </p:childTnLst>
+                    </p:cTn>
+                  </p:par>
+                </p:childTnLst>
+              </p:cTn>
+              <p:prevCondLst>
+                <p:cond evt="onPrev" delay="0">
+                  <p:tgtEl>
+                    <p:sldTgt/>
+                  </p:tgtEl>
+                </p:cond>
+              </p:prevCondLst>
+              <p:nextCondLst>
+                <p:cond evt="onNext" delay="0">
+                  <p:tgtEl>
+                    <p:sldTgt/>
+                  </p:tgtEl>
+                </p:cond>
+              </p:nextCondLst>
+            </p:seq>
+          </p:childTnLst>
+        </p:cTn>
       </p:par>
     </p:tnLst>
   </p:timing>
@@ -6915,12 +8344,7 @@
             <p:ph type="title"/>
           </p:nvPr>
         </p:nvSpPr>
-        <p:spPr>
-          <a:xfrm>
-            <a:off x="838200" y="315541"/>
-            <a:ext cx="10515600" cy="1325563"/>
-          </a:xfrm>
-        </p:spPr>
+        <p:spPr/>
         <p:txBody>
           <a:bodyPr/>
           <a:lstStyle/>
@@ -6931,15 +8355,7 @@
                   <a:schemeClr val="bg1"/>
                 </a:solidFill>
               </a:rPr>
-              <a:t>Cavins and </a:t>
-            </a:r>
-            <a:r>
-              <a:rPr lang="en-US" b="1" dirty="0" smtClean="0">
-                <a:solidFill>
-                  <a:schemeClr val="bg1"/>
-                </a:solidFill>
-              </a:rPr>
-              <a:t>Export</a:t>
+              <a:t>Hypotheses and Aims:</a:t>
             </a:r>
             <a:endParaRPr lang="en-AU" b="1" dirty="0">
               <a:solidFill>
@@ -6961,198 +8377,103 @@
         </p:nvSpPr>
         <p:spPr>
           <a:xfrm>
-            <a:off x="838200" y="1759638"/>
-            <a:ext cx="10515600" cy="4582275"/>
+            <a:off x="838200" y="1939870"/>
+            <a:ext cx="10515600" cy="3981281"/>
           </a:xfrm>
         </p:spPr>
         <p:txBody>
           <a:bodyPr>
-            <a:normAutofit fontScale="85000" lnSpcReduction="20000"/>
+            <a:normAutofit/>
           </a:bodyPr>
           <a:lstStyle/>
           <a:p>
-            <a:r>
-              <a:rPr lang="en-AU" sz="3300" dirty="0" smtClean="0"/>
-              <a:t>Introduction </a:t>
-            </a:r>
-            <a:r>
-              <a:rPr lang="en-AU" sz="3300" dirty="0"/>
-              <a:t>of Cavin-1 results in modulated </a:t>
-            </a:r>
-            <a:r>
-              <a:rPr lang="en-AU" sz="3300" dirty="0" smtClean="0"/>
-              <a:t>cholesterol </a:t>
-            </a:r>
-            <a:r>
-              <a:rPr lang="en-AU" sz="3300" dirty="0"/>
-              <a:t>re-distribution, EV protein content and </a:t>
-            </a:r>
-            <a:r>
-              <a:rPr lang="en-AU" sz="3300" dirty="0" err="1"/>
-              <a:t>miR</a:t>
-            </a:r>
-            <a:r>
-              <a:rPr lang="en-AU" sz="3300" dirty="0"/>
-              <a:t> content. </a:t>
-            </a:r>
-            <a:endParaRPr lang="en-AU" sz="3300" dirty="0" smtClean="0"/>
-          </a:p>
-          <a:p>
             <a:pPr marL="0" indent="0">
               <a:buNone/>
             </a:pPr>
-            <a:endParaRPr lang="en-US" sz="2200" dirty="0" smtClean="0"/>
+            <a:r>
+              <a:rPr lang="en-AU" sz="2400" b="1" dirty="0" smtClean="0"/>
+              <a:t>Hypothesis</a:t>
+            </a:r>
+            <a:r>
+              <a:rPr lang="en-AU" sz="2400" dirty="0" smtClean="0"/>
+              <a:t>: </a:t>
+            </a:r>
           </a:p>
           <a:p>
             <a:pPr marL="0" indent="0">
               <a:buNone/>
             </a:pPr>
-            <a:endParaRPr lang="en-US" sz="2200" dirty="0" smtClean="0"/>
+            <a:r>
+              <a:rPr lang="en-AU" sz="2400" dirty="0" smtClean="0"/>
+              <a:t>Extracellular vesicle miRNA content is mediated by RNA-binding proteins modulated by lipid raft composition. </a:t>
+            </a:r>
           </a:p>
           <a:p>
             <a:pPr marL="0" indent="0">
               <a:buNone/>
             </a:pPr>
-            <a:endParaRPr lang="en-US" sz="2200" dirty="0" smtClean="0"/>
+            <a:endParaRPr lang="en-AU" sz="2400" dirty="0" smtClean="0"/>
           </a:p>
           <a:p>
             <a:pPr marL="0" indent="0">
               <a:buNone/>
             </a:pPr>
-            <a:endParaRPr lang="en-US" sz="2200" dirty="0" smtClean="0"/>
-          </a:p>
-          <a:p>
-            <a:pPr marL="0" indent="0">
-              <a:buNone/>
-            </a:pPr>
-            <a:endParaRPr lang="en-US" sz="2200" dirty="0" smtClean="0"/>
-          </a:p>
-          <a:p>
-            <a:pPr marL="0" indent="0">
-              <a:buNone/>
-            </a:pPr>
-            <a:endParaRPr lang="en-US" sz="2200" dirty="0"/>
-          </a:p>
-          <a:p>
-            <a:pPr>
-              <a:lnSpc>
-                <a:spcPct val="150000"/>
-              </a:lnSpc>
-            </a:pPr>
-            <a:endParaRPr lang="en-US" sz="2200" dirty="0" smtClean="0"/>
-          </a:p>
-          <a:p>
-            <a:pPr>
-              <a:lnSpc>
-                <a:spcPct val="150000"/>
-              </a:lnSpc>
-            </a:pPr>
-            <a:endParaRPr lang="en-US" dirty="0" smtClean="0"/>
-          </a:p>
-          <a:p>
-            <a:pPr>
-              <a:lnSpc>
-                <a:spcPct val="150000"/>
-              </a:lnSpc>
-            </a:pPr>
-            <a:r>
-              <a:rPr lang="en-US" sz="2900" dirty="0" smtClean="0"/>
-              <a:t>Hereby,  modulation of miRNA export is dependent of lipid raft composition. </a:t>
-            </a:r>
-            <a:endParaRPr lang="en-AU" sz="2900" dirty="0"/>
-          </a:p>
-        </p:txBody>
-      </p:sp>
-      <p:sp>
-        <p:nvSpPr>
-          <p:cNvPr id="5" name="TextBox 4"/>
-          <p:cNvSpPr txBox="1"/>
-          <p:nvPr/>
-        </p:nvSpPr>
-        <p:spPr>
-          <a:xfrm>
-            <a:off x="8547796" y="5179733"/>
-            <a:ext cx="3084394" cy="338554"/>
-          </a:xfrm>
-          <a:prstGeom prst="rect">
-            <a:avLst/>
-          </a:prstGeom>
-          <a:noFill/>
-        </p:spPr>
-        <p:txBody>
-          <a:bodyPr wrap="square" rtlCol="0">
-            <a:spAutoFit/>
-          </a:bodyPr>
-          <a:lstStyle/>
-          <a:p>
-            <a:r>
-              <a:rPr lang="en-AU" sz="1600" dirty="0" smtClean="0"/>
-              <a:t>(</a:t>
-            </a:r>
-            <a:r>
-              <a:rPr lang="en-AU" sz="1600" dirty="0" err="1" smtClean="0"/>
-              <a:t>Inder</a:t>
-            </a:r>
-            <a:r>
-              <a:rPr lang="en-AU" sz="1600" dirty="0" smtClean="0"/>
+            <a:r>
+              <a:rPr lang="en-AU" sz="2400" b="1" dirty="0" smtClean="0"/>
+              <a:t>Aims:</a:t>
+            </a:r>
+          </a:p>
+          <a:p>
+            <a:pPr marL="542925" indent="-276225"/>
+            <a:r>
+              <a:rPr lang="en-AU" sz="2400" dirty="0" smtClean="0"/>
+              <a:t>Identify the </a:t>
+            </a:r>
+            <a:r>
+              <a:rPr lang="en-AU" sz="2400" dirty="0"/>
+              <a:t>selectively </a:t>
+            </a:r>
+            <a:r>
+              <a:rPr lang="en-AU" sz="2400" dirty="0" smtClean="0"/>
+              <a:t>exported </a:t>
+            </a:r>
+            <a:r>
+              <a:rPr lang="en-AU" sz="2400" dirty="0" err="1" smtClean="0"/>
+              <a:t>miRNAs</a:t>
+            </a:r>
+            <a:r>
+              <a:rPr lang="en-AU" sz="2400" dirty="0" smtClean="0"/>
               <a:t> </a:t>
             </a:r>
-            <a:r>
-              <a:rPr lang="en-AU" sz="1600" i="1" dirty="0" smtClean="0"/>
-              <a:t>et al </a:t>
-            </a:r>
-            <a:r>
-              <a:rPr lang="en-AU" sz="1600" dirty="0" smtClean="0"/>
-              <a:t>2012; </a:t>
-            </a:r>
-            <a:r>
-              <a:rPr lang="en-AU" sz="1600" dirty="0" err="1" smtClean="0"/>
-              <a:t>Inder</a:t>
-            </a:r>
-            <a:r>
-              <a:rPr lang="en-AU" sz="1600" dirty="0" smtClean="0"/>
-              <a:t> </a:t>
-            </a:r>
-            <a:r>
-              <a:rPr lang="en-AU" sz="1600" i="1" dirty="0" smtClean="0"/>
-              <a:t>et al </a:t>
-            </a:r>
-            <a:r>
-              <a:rPr lang="en-AU" sz="1600" dirty="0" smtClean="0"/>
-              <a:t>2014)</a:t>
-            </a:r>
-            <a:endParaRPr lang="en-AU" sz="1600" dirty="0"/>
-          </a:p>
-        </p:txBody>
-      </p:sp>
-      <p:pic>
-        <p:nvPicPr>
-          <p:cNvPr id="7" name="Picture 6"/>
-          <p:cNvPicPr>
-            <a:picLocks noChangeAspect="1"/>
-          </p:cNvPicPr>
-          <p:nvPr/>
-        </p:nvPicPr>
-        <p:blipFill>
-          <a:blip r:embed="rId2"/>
-          <a:stretch>
-            <a:fillRect/>
-          </a:stretch>
-        </p:blipFill>
-        <p:spPr>
-          <a:xfrm>
-            <a:off x="623168" y="2878667"/>
-            <a:ext cx="11009022" cy="2301066"/>
-          </a:xfrm>
-          <a:prstGeom prst="rect">
-            <a:avLst/>
-          </a:prstGeom>
-        </p:spPr>
-      </p:pic>
+          </a:p>
+          <a:p>
+            <a:pPr marL="542925" indent="-276225"/>
+            <a:r>
+              <a:rPr lang="en-AU" sz="2400" dirty="0" smtClean="0"/>
+              <a:t>Identify RNA-binding proteins correlated to the miRNA export</a:t>
+            </a:r>
+          </a:p>
+          <a:p>
+            <a:pPr marL="542925" indent="-276225"/>
+            <a:r>
+              <a:rPr lang="en-AU" sz="2400" dirty="0" smtClean="0"/>
+              <a:t>Verify candidate miRNA escort proteins ability to bind to miRNAs and transport to </a:t>
+            </a:r>
+            <a:r>
+              <a:rPr lang="en-AU" sz="2400" dirty="0"/>
+              <a:t>e</a:t>
+            </a:r>
+            <a:r>
+              <a:rPr lang="en-AU" sz="2400" dirty="0" smtClean="0"/>
+              <a:t>xtracellular vesicles.</a:t>
+            </a:r>
+          </a:p>
+        </p:txBody>
+      </p:sp>
     </p:spTree>
     <p:extLst>
       <p:ext uri="{BB962C8B-B14F-4D97-AF65-F5344CB8AC3E}">
-        <p14:creationId xmlns:p14="http://schemas.microsoft.com/office/powerpoint/2010/main" val="122657898"/>
+        <p14:creationId xmlns:p14="http://schemas.microsoft.com/office/powerpoint/2010/main" val="2339122931"/>
       </p:ext>
     </p:extLst>
   </p:cSld>
@@ -7207,7 +8528,7 @@
                   <a:schemeClr val="bg1"/>
                 </a:solidFill>
               </a:rPr>
-              <a:t>Hypotheses and Aims:</a:t>
+              <a:t>Aim 1: Analysis of miRNA Export</a:t>
             </a:r>
             <a:endParaRPr lang="en-AU" b="1" dirty="0">
               <a:solidFill>
@@ -7229,8 +8550,8 @@
         </p:nvSpPr>
         <p:spPr>
           <a:xfrm>
-            <a:off x="838200" y="1939870"/>
-            <a:ext cx="10515600" cy="3981281"/>
+            <a:off x="680740" y="1554692"/>
+            <a:ext cx="10830515" cy="4351338"/>
           </a:xfrm>
         </p:spPr>
         <p:txBody>
@@ -7244,80 +8565,153 @@
             </a:pPr>
             <a:r>
               <a:rPr lang="en-AU" sz="2400" b="1" dirty="0" smtClean="0"/>
-              <a:t>Hypothesis</a:t>
-            </a:r>
-            <a:r>
-              <a:rPr lang="en-AU" sz="2400" dirty="0" smtClean="0"/>
-              <a:t>: </a:t>
-            </a:r>
-          </a:p>
-          <a:p>
-            <a:pPr marL="0" indent="0">
-              <a:buNone/>
+              <a:t>Method 1: Bioinformatics</a:t>
+            </a:r>
+          </a:p>
+          <a:p>
+            <a:pPr>
+              <a:lnSpc>
+                <a:spcPct val="100000"/>
+              </a:lnSpc>
             </a:pPr>
             <a:r>
-              <a:rPr lang="en-AU" sz="2400" dirty="0" smtClean="0"/>
-              <a:t>EV miRNA content is mediated by RNA-binding proteins modulated by lipid raft composition. </a:t>
-            </a:r>
-          </a:p>
-          <a:p>
-            <a:pPr marL="0" indent="0">
-              <a:buNone/>
-            </a:pPr>
-            <a:endParaRPr lang="en-AU" sz="2400" dirty="0" smtClean="0"/>
-          </a:p>
-          <a:p>
-            <a:pPr marL="0" indent="0">
-              <a:buNone/>
-            </a:pPr>
-            <a:r>
-              <a:rPr lang="en-AU" sz="2400" b="1" dirty="0" smtClean="0"/>
-              <a:t>Aims:</a:t>
-            </a:r>
-          </a:p>
-          <a:p>
-            <a:pPr marL="542925" indent="-276225"/>
-            <a:r>
-              <a:rPr lang="en-AU" sz="2400" dirty="0" smtClean="0"/>
-              <a:t>Identify the </a:t>
-            </a:r>
-            <a:r>
-              <a:rPr lang="en-AU" sz="2400" dirty="0"/>
-              <a:t>selectively </a:t>
-            </a:r>
-            <a:r>
-              <a:rPr lang="en-AU" sz="2400" dirty="0" smtClean="0"/>
-              <a:t>exported </a:t>
-            </a:r>
-            <a:r>
               <a:rPr lang="en-AU" sz="2400" dirty="0" err="1" smtClean="0"/>
-              <a:t>miRNAs</a:t>
+              <a:t>miRNA-seq</a:t>
             </a:r>
             <a:r>
               <a:rPr lang="en-AU" sz="2400" dirty="0" smtClean="0"/>
               <a:t> </a:t>
             </a:r>
-          </a:p>
-          <a:p>
-            <a:pPr marL="542925" indent="-276225"/>
             <a:r>
               <a:rPr lang="en-AU" sz="2400" dirty="0" smtClean="0"/>
-              <a:t>Identify RNA-binding proteins correlated to the miRNA export</a:t>
-            </a:r>
-          </a:p>
-          <a:p>
-            <a:pPr marL="542925" indent="-276225"/>
+              <a:t>data compiled: </a:t>
+            </a:r>
+            <a:r>
+              <a:rPr lang="en-AU" sz="2400" dirty="0"/>
+              <a:t>EVs and cell </a:t>
+            </a:r>
             <a:r>
               <a:rPr lang="en-AU" sz="2400" dirty="0" smtClean="0"/>
-              <a:t>Verify candidate miRNA escort proteins ability to bind to miRNAs and transport to EVs.</a:t>
-            </a:r>
-          </a:p>
-        </p:txBody>
-      </p:sp>
+              <a:t>from </a:t>
+            </a:r>
+            <a:r>
+              <a:rPr lang="en-AU" sz="2400" b="1" dirty="0" smtClean="0"/>
+              <a:t>P</a:t>
+            </a:r>
+            <a:r>
+              <a:rPr lang="en-AU" sz="2400" b="1" dirty="0" smtClean="0"/>
+              <a:t>C3-GFP</a:t>
+            </a:r>
+            <a:r>
+              <a:rPr lang="en-AU" sz="2400" dirty="0" smtClean="0"/>
+              <a:t> </a:t>
+            </a:r>
+            <a:r>
+              <a:rPr lang="en-AU" sz="2400" dirty="0" smtClean="0"/>
+              <a:t>and </a:t>
+            </a:r>
+            <a:r>
+              <a:rPr lang="en-AU" sz="2400" b="1" dirty="0" smtClean="0"/>
+              <a:t>PC3</a:t>
+            </a:r>
+            <a:r>
+              <a:rPr lang="en-AU" sz="2400" dirty="0"/>
+              <a:t>-</a:t>
+            </a:r>
+            <a:r>
+              <a:rPr lang="en-AU" sz="2400" b="1" dirty="0" smtClean="0"/>
+              <a:t>GFP::Cavin1 </a:t>
+            </a:r>
+            <a:r>
+              <a:rPr lang="en-AU" sz="2400" dirty="0" smtClean="0"/>
+              <a:t>cells</a:t>
+            </a:r>
+            <a:r>
+              <a:rPr lang="en-AU" sz="2400" dirty="0"/>
+              <a:t>.</a:t>
+            </a:r>
+            <a:endParaRPr lang="en-AU" sz="2400" dirty="0" smtClean="0"/>
+          </a:p>
+          <a:p>
+            <a:pPr>
+              <a:lnSpc>
+                <a:spcPct val="100000"/>
+              </a:lnSpc>
+            </a:pPr>
+            <a:r>
+              <a:rPr lang="en-AU" sz="2400" dirty="0" smtClean="0"/>
+              <a:t>DEseq2 and </a:t>
+            </a:r>
+            <a:r>
+              <a:rPr lang="en-AU" sz="2400" dirty="0" err="1" smtClean="0"/>
+              <a:t>egdeR</a:t>
+            </a:r>
+            <a:r>
+              <a:rPr lang="en-AU" sz="2400" dirty="0" smtClean="0"/>
+              <a:t> find differences in miRNA levels between cell lines</a:t>
+            </a:r>
+            <a:endParaRPr lang="en-AU" sz="2400" dirty="0"/>
+          </a:p>
+          <a:p>
+            <a:pPr>
+              <a:lnSpc>
+                <a:spcPct val="100000"/>
+              </a:lnSpc>
+            </a:pPr>
+            <a:r>
+              <a:rPr lang="en-AU" sz="2400" dirty="0" smtClean="0"/>
+              <a:t>Compare between cell and EV to find selectively exported miRNAs. </a:t>
+            </a:r>
+          </a:p>
+          <a:p>
+            <a:endParaRPr lang="en-US" sz="2400" dirty="0" smtClean="0"/>
+          </a:p>
+          <a:p>
+            <a:pPr marL="0" indent="0">
+              <a:buNone/>
+            </a:pPr>
+            <a:r>
+              <a:rPr lang="en-US" sz="2400" b="1" dirty="0" smtClean="0"/>
+              <a:t>Method 2: RT-qPCR</a:t>
+            </a:r>
+            <a:endParaRPr lang="en-AU" sz="2400" b="1" dirty="0"/>
+          </a:p>
+        </p:txBody>
+      </p:sp>
+      <p:pic>
+        <p:nvPicPr>
+          <p:cNvPr id="5" name="Picture 4"/>
+          <p:cNvPicPr>
+            <a:picLocks noChangeAspect="1"/>
+          </p:cNvPicPr>
+          <p:nvPr/>
+        </p:nvPicPr>
+        <p:blipFill>
+          <a:blip r:embed="rId3">
+            <a:extLst>
+              <a:ext uri="{28A0092B-C50C-407E-A947-70E740481C1C}">
+                <a14:useLocalDpi xmlns:a14="http://schemas.microsoft.com/office/drawing/2010/main" val="0"/>
+              </a:ext>
+            </a:extLst>
+          </a:blip>
+          <a:stretch>
+            <a:fillRect/>
+          </a:stretch>
+        </p:blipFill>
+        <p:spPr>
+          <a:xfrm>
+            <a:off x="1342406" y="4592941"/>
+            <a:ext cx="9507185" cy="1543051"/>
+          </a:xfrm>
+          <a:prstGeom prst="rect">
+            <a:avLst/>
+          </a:prstGeom>
+        </p:spPr>
+      </p:pic>
     </p:spTree>
     <p:extLst>
       <p:ext uri="{BB962C8B-B14F-4D97-AF65-F5344CB8AC3E}">
-        <p14:creationId xmlns:p14="http://schemas.microsoft.com/office/powerpoint/2010/main" val="2339122931"/>
+        <p14:creationId xmlns:p14="http://schemas.microsoft.com/office/powerpoint/2010/main" val="3986726622"/>
       </p:ext>
     </p:extLst>
   </p:cSld>
@@ -7363,26 +8757,52 @@
         </p:nvSpPr>
         <p:spPr/>
         <p:txBody>
-          <a:bodyPr/>
-          <a:lstStyle/>
-          <a:p>
-            <a:r>
-              <a:rPr lang="en-US" b="1" dirty="0" smtClean="0">
+          <a:bodyPr>
+            <a:normAutofit/>
+          </a:bodyPr>
+          <a:lstStyle/>
+          <a:p>
+            <a:r>
+              <a:rPr lang="en-AU" sz="4000" b="1" dirty="0" smtClean="0">
                 <a:solidFill>
                   <a:schemeClr val="bg1"/>
                 </a:solidFill>
               </a:rPr>
-              <a:t>Aim 1: Analysis of miRNA </a:t>
-            </a:r>
-            <a:r>
-              <a:rPr lang="en-US" b="1" dirty="0" smtClean="0">
+              <a:t>Aim 2: Identify Candidate </a:t>
+            </a:r>
+            <a:r>
+              <a:rPr lang="en-AU" sz="4000" b="1" dirty="0" err="1" smtClean="0">
                 <a:solidFill>
                   <a:schemeClr val="bg1"/>
                 </a:solidFill>
               </a:rPr>
-              <a:t>Export</a:t>
-            </a:r>
-            <a:endParaRPr lang="en-AU" b="1" dirty="0">
+              <a:t>miR</a:t>
+            </a:r>
+            <a:r>
+              <a:rPr lang="en-AU" sz="4000" b="1" dirty="0" smtClean="0">
+                <a:solidFill>
+                  <a:schemeClr val="bg1"/>
+                </a:solidFill>
+              </a:rPr>
+              <a:t> Binding </a:t>
+            </a:r>
+            <a:r>
+              <a:rPr lang="en-AU" sz="4000" b="1" dirty="0">
+                <a:solidFill>
+                  <a:schemeClr val="bg1"/>
+                </a:solidFill>
+              </a:rPr>
+              <a:t>P</a:t>
+            </a:r>
+            <a:r>
+              <a:rPr lang="en-AU" sz="4000" b="1" dirty="0" smtClean="0">
+                <a:solidFill>
+                  <a:schemeClr val="bg1"/>
+                </a:solidFill>
+              </a:rPr>
+              <a:t>roteins.</a:t>
+            </a:r>
+            <a:endParaRPr lang="en-AU" sz="4000" b="1" dirty="0">
               <a:solidFill>
                 <a:schemeClr val="bg1"/>
               </a:solidFill>
@@ -7402,13 +8822,13 @@
         </p:nvSpPr>
         <p:spPr>
           <a:xfrm>
-            <a:off x="680740" y="1554692"/>
-            <a:ext cx="10830515" cy="4351338"/>
+            <a:off x="838200" y="1583140"/>
+            <a:ext cx="5729216" cy="4593823"/>
           </a:xfrm>
         </p:spPr>
         <p:txBody>
           <a:bodyPr>
-            <a:normAutofit/>
+            <a:normAutofit fontScale="92500"/>
           </a:bodyPr>
           <a:lstStyle/>
           <a:p>
@@ -7416,57 +8836,82 @@
               <a:buNone/>
             </a:pPr>
             <a:r>
-              <a:rPr lang="en-AU" sz="2400" b="1" dirty="0" smtClean="0"/>
-              <a:t>Method 1: Bioinformatics</a:t>
-            </a:r>
-          </a:p>
-          <a:p>
-            <a:r>
-              <a:rPr lang="en-AU" sz="2400" dirty="0" smtClean="0"/>
-              <a:t>miRNA-</a:t>
-            </a:r>
-            <a:r>
-              <a:rPr lang="en-AU" sz="2400" dirty="0" err="1" smtClean="0"/>
-              <a:t>seq</a:t>
-            </a:r>
-            <a:r>
-              <a:rPr lang="en-AU" sz="2400" dirty="0" smtClean="0"/>
-              <a:t> data compiled: GFP-PC3 and GFP:Cavin1-PC3 cells, EVs and cell pellet</a:t>
-            </a:r>
-          </a:p>
-          <a:p>
-            <a:r>
-              <a:rPr lang="en-AU" sz="2400" dirty="0" smtClean="0"/>
-              <a:t>DEseq2 and </a:t>
-            </a:r>
-            <a:r>
-              <a:rPr lang="en-AU" sz="2400" dirty="0" err="1" smtClean="0"/>
-              <a:t>egdeR</a:t>
-            </a:r>
-            <a:r>
-              <a:rPr lang="en-AU" sz="2400" dirty="0" smtClean="0"/>
-              <a:t> find differences in miRNA levels between cell lines</a:t>
-            </a:r>
-            <a:endParaRPr lang="en-AU" sz="2400" dirty="0"/>
-          </a:p>
-          <a:p>
-            <a:r>
-              <a:rPr lang="en-AU" sz="2400" dirty="0" smtClean="0"/>
-              <a:t>Compare between cell and EV to find selectively exported miRNAs. </a:t>
-            </a:r>
-          </a:p>
-          <a:p>
-            <a:endParaRPr lang="en-US" sz="2400" dirty="0" smtClean="0"/>
+              <a:rPr lang="en-AU" b="1" dirty="0" smtClean="0"/>
+              <a:t>Method 1: Computational analysis. </a:t>
+            </a:r>
           </a:p>
           <a:p>
             <a:pPr marL="0" indent="0">
               <a:buNone/>
             </a:pPr>
-            <a:r>
-              <a:rPr lang="en-US" sz="2400" b="1" dirty="0" smtClean="0"/>
-              <a:t>Method 2: RT-qPCR</a:t>
-            </a:r>
-            <a:endParaRPr lang="en-AU" sz="2400" b="1" dirty="0"/>
+            <a:endParaRPr lang="en-AU" sz="2200" dirty="0" smtClean="0"/>
+          </a:p>
+          <a:p>
+            <a:pPr>
+              <a:lnSpc>
+                <a:spcPct val="100000"/>
+              </a:lnSpc>
+            </a:pPr>
+            <a:r>
+              <a:rPr lang="en-AU" sz="2600" dirty="0" smtClean="0"/>
+              <a:t>Proteomics collected for the lipid </a:t>
+            </a:r>
+            <a:r>
+              <a:rPr lang="en-AU" sz="2600" dirty="0" smtClean="0"/>
+              <a:t>raft and </a:t>
+            </a:r>
+            <a:r>
+              <a:rPr lang="en-AU" sz="2600" dirty="0" smtClean="0"/>
+              <a:t>EVs for PC3 GFP and PC3 cavin-1 cells. </a:t>
+            </a:r>
+          </a:p>
+          <a:p>
+            <a:pPr marL="0" indent="0">
+              <a:lnSpc>
+                <a:spcPct val="100000"/>
+              </a:lnSpc>
+              <a:buNone/>
+            </a:pPr>
+            <a:endParaRPr lang="en-AU" sz="2600" dirty="0" smtClean="0"/>
+          </a:p>
+          <a:p>
+            <a:pPr>
+              <a:lnSpc>
+                <a:spcPct val="100000"/>
+              </a:lnSpc>
+            </a:pPr>
+            <a:r>
+              <a:rPr lang="en-US" sz="2600" dirty="0" smtClean="0"/>
+              <a:t>Identify proteins modified in EV </a:t>
+            </a:r>
+            <a:r>
+              <a:rPr lang="en-US" sz="2600" b="1" dirty="0" smtClean="0"/>
+              <a:t>and</a:t>
+            </a:r>
+            <a:r>
+              <a:rPr lang="en-US" sz="2600" dirty="0" smtClean="0"/>
+              <a:t> lipid raft fraction between cell lines</a:t>
+            </a:r>
+          </a:p>
+          <a:p>
+            <a:pPr>
+              <a:lnSpc>
+                <a:spcPct val="100000"/>
+              </a:lnSpc>
+            </a:pPr>
+            <a:endParaRPr lang="en-US" sz="2600" dirty="0" smtClean="0"/>
+          </a:p>
+          <a:p>
+            <a:pPr>
+              <a:lnSpc>
+                <a:spcPct val="100000"/>
+              </a:lnSpc>
+            </a:pPr>
+            <a:r>
+              <a:rPr lang="en-US" sz="2600" dirty="0" smtClean="0"/>
+              <a:t>Gene Ontology analysis determines RNA-binding ability. </a:t>
+            </a:r>
+            <a:endParaRPr lang="en-AU" sz="3500" dirty="0"/>
           </a:p>
         </p:txBody>
       </p:sp>
@@ -7479,21 +8924,15 @@
           <p:nvPr/>
         </p:nvPicPr>
         <p:blipFill>
-          <a:blip r:embed="rId2">
-            <a:extLst>
-              <a:ext uri="{28A0092B-C50C-407E-A947-70E740481C1C}">
-                <a14:useLocalDpi xmlns:a14="http://schemas.microsoft.com/office/drawing/2010/main" val="0"/>
-              </a:ext>
-            </a:extLst>
-          </a:blip>
+          <a:blip r:embed="rId3"/>
           <a:stretch>
             <a:fillRect/>
           </a:stretch>
         </p:blipFill>
         <p:spPr>
           <a:xfrm>
-            <a:off x="1342406" y="4592941"/>
-            <a:ext cx="9507185" cy="1543051"/>
+            <a:off x="6889522" y="1633538"/>
+            <a:ext cx="4886325" cy="4600575"/>
           </a:xfrm>
           <a:prstGeom prst="rect">
             <a:avLst/>
@@ -7503,7 +8942,7 @@
     </p:spTree>
     <p:extLst>
       <p:ext uri="{BB962C8B-B14F-4D97-AF65-F5344CB8AC3E}">
-        <p14:creationId xmlns:p14="http://schemas.microsoft.com/office/powerpoint/2010/main" val="3986726622"/>
+        <p14:creationId xmlns:p14="http://schemas.microsoft.com/office/powerpoint/2010/main" val="347616013"/>
       </p:ext>
     </p:extLst>
   </p:cSld>

</xml_diff>